<commit_message>
Changed layout and added temp file to gitignore
</commit_message>
<xml_diff>
--- a/Zwischenpräsentation.pptx
+++ b/Zwischenpräsentation.pptx
@@ -7489,6 +7489,14 @@
 <file path=ppt/slides/slide2.xml><?xml version="1.0" encoding="utf-8"?>
 <p:sld xmlns:a="http://schemas.openxmlformats.org/drawingml/2006/main" xmlns:r="http://schemas.openxmlformats.org/officeDocument/2006/relationships" xmlns:p="http://schemas.openxmlformats.org/presentationml/2006/main">
   <p:cSld>
+    <p:bg>
+      <p:bgPr>
+        <a:solidFill>
+          <a:schemeClr val="bg1"/>
+        </a:solidFill>
+        <a:effectLst/>
+      </p:bgPr>
+    </p:bg>
     <p:spTree>
       <p:nvGrpSpPr>
         <p:cNvPr id="1" name=""/>
@@ -7503,6 +7511,66 @@
           <a:chExt cx="0" cy="0"/>
         </a:xfrm>
       </p:grpSpPr>
+      <p:sp useBgFill="1">
+        <p:nvSpPr>
+          <p:cNvPr id="8" name="Rectangle 7">
+            <a:extLst>
+              <a:ext uri="{FF2B5EF4-FFF2-40B4-BE49-F238E27FC236}">
+                <a16:creationId xmlns:a16="http://schemas.microsoft.com/office/drawing/2014/main" id="{777A147A-9ED8-46B4-8660-1B3C2AA880B5}"/>
+              </a:ext>
+              <a:ext uri="{C183D7F6-B498-43B3-948B-1728B52AA6E4}">
+                <adec:decorative xmlns:adec="http://schemas.microsoft.com/office/drawing/2017/decorative" val="1"/>
+              </a:ext>
+            </a:extLst>
+          </p:cNvPr>
+          <p:cNvSpPr>
+            <a:spLocks noGrp="1" noRot="1" noChangeAspect="1" noMove="1" noResize="1" noEditPoints="1" noAdjustHandles="1" noChangeArrowheads="1" noChangeShapeType="1" noTextEdit="1"/>
+          </p:cNvSpPr>
+          <p:nvPr>
+            <p:extLst>
+              <p:ext uri="{386F3935-93C4-4BCD-93E2-E3B085C9AB24}">
+                <p16:designElem xmlns:p16="http://schemas.microsoft.com/office/powerpoint/2015/main" val="1"/>
+              </p:ext>
+            </p:extLst>
+          </p:nvPr>
+        </p:nvSpPr>
+        <p:spPr>
+          <a:xfrm>
+            <a:off x="0" y="0"/>
+            <a:ext cx="12188952" cy="6858000"/>
+          </a:xfrm>
+          <a:prstGeom prst="rect">
+            <a:avLst/>
+          </a:prstGeom>
+          <a:ln>
+            <a:noFill/>
+          </a:ln>
+        </p:spPr>
+        <p:style>
+          <a:lnRef idx="2">
+            <a:schemeClr val="accent1">
+              <a:shade val="50000"/>
+            </a:schemeClr>
+          </a:lnRef>
+          <a:fillRef idx="1">
+            <a:schemeClr val="accent1"/>
+          </a:fillRef>
+          <a:effectRef idx="0">
+            <a:schemeClr val="accent1"/>
+          </a:effectRef>
+          <a:fontRef idx="minor">
+            <a:schemeClr val="lt1"/>
+          </a:fontRef>
+        </p:style>
+        <p:txBody>
+          <a:bodyPr rtlCol="0" anchor="ctr"/>
+          <a:lstStyle/>
+          <a:p>
+            <a:pPr algn="ctr"/>
+            <a:endParaRPr lang="en-US"/>
+          </a:p>
+        </p:txBody>
+      </p:sp>
       <p:sp>
         <p:nvSpPr>
           <p:cNvPr id="2" name="Titel 1">
@@ -7519,15 +7587,365 @@
             <p:ph type="title"/>
           </p:nvPr>
         </p:nvSpPr>
-        <p:spPr/>
+        <p:spPr>
+          <a:xfrm>
+            <a:off x="841248" y="548640"/>
+            <a:ext cx="3419540" cy="5431536"/>
+          </a:xfrm>
+        </p:spPr>
         <p:txBody>
-          <a:bodyPr/>
+          <a:bodyPr>
+            <a:normAutofit/>
+          </a:bodyPr>
           <a:lstStyle/>
           <a:p>
             <a:r>
-              <a:rPr lang="de-DE" dirty="0"/>
+              <a:rPr lang="de-DE" sz="6000"/>
               <a:t>Stand</a:t>
             </a:r>
+          </a:p>
+        </p:txBody>
+      </p:sp>
+      <p:sp>
+        <p:nvSpPr>
+          <p:cNvPr id="10" name="Rectangle 6">
+            <a:extLst>
+              <a:ext uri="{FF2B5EF4-FFF2-40B4-BE49-F238E27FC236}">
+                <a16:creationId xmlns:a16="http://schemas.microsoft.com/office/drawing/2014/main" id="{5D6C15A0-C087-4593-8414-2B4EC1CDC3DE}"/>
+              </a:ext>
+              <a:ext uri="{C183D7F6-B498-43B3-948B-1728B52AA6E4}">
+                <adec:decorative xmlns:adec="http://schemas.microsoft.com/office/drawing/2017/decorative" val="1"/>
+              </a:ext>
+            </a:extLst>
+          </p:cNvPr>
+          <p:cNvSpPr>
+            <a:spLocks noGrp="1" noRot="1" noChangeAspect="1" noMove="1" noResize="1" noEditPoints="1" noAdjustHandles="1" noChangeArrowheads="1" noChangeShapeType="1" noTextEdit="1"/>
+          </p:cNvSpPr>
+          <p:nvPr>
+            <p:extLst>
+              <p:ext uri="{386F3935-93C4-4BCD-93E2-E3B085C9AB24}">
+                <p16:designElem xmlns:p16="http://schemas.microsoft.com/office/powerpoint/2015/main" val="1"/>
+              </p:ext>
+            </p:extLst>
+          </p:nvPr>
+        </p:nvSpPr>
+        <p:spPr>
+          <a:xfrm rot="5400000">
+            <a:off x="2539411" y="3254143"/>
+            <a:ext cx="4480560" cy="27432"/>
+          </a:xfrm>
+          <a:custGeom>
+            <a:avLst/>
+            <a:gdLst>
+              <a:gd name="connsiteX0" fmla="*/ 0 w 4480560"/>
+              <a:gd name="connsiteY0" fmla="*/ 0 h 27432"/>
+              <a:gd name="connsiteX1" fmla="*/ 595274 w 4480560"/>
+              <a:gd name="connsiteY1" fmla="*/ 0 h 27432"/>
+              <a:gd name="connsiteX2" fmla="*/ 1100938 w 4480560"/>
+              <a:gd name="connsiteY2" fmla="*/ 0 h 27432"/>
+              <a:gd name="connsiteX3" fmla="*/ 1651406 w 4480560"/>
+              <a:gd name="connsiteY3" fmla="*/ 0 h 27432"/>
+              <a:gd name="connsiteX4" fmla="*/ 2336292 w 4480560"/>
+              <a:gd name="connsiteY4" fmla="*/ 0 h 27432"/>
+              <a:gd name="connsiteX5" fmla="*/ 2931566 w 4480560"/>
+              <a:gd name="connsiteY5" fmla="*/ 0 h 27432"/>
+              <a:gd name="connsiteX6" fmla="*/ 3482035 w 4480560"/>
+              <a:gd name="connsiteY6" fmla="*/ 0 h 27432"/>
+              <a:gd name="connsiteX7" fmla="*/ 4480560 w 4480560"/>
+              <a:gd name="connsiteY7" fmla="*/ 0 h 27432"/>
+              <a:gd name="connsiteX8" fmla="*/ 4480560 w 4480560"/>
+              <a:gd name="connsiteY8" fmla="*/ 27432 h 27432"/>
+              <a:gd name="connsiteX9" fmla="*/ 3840480 w 4480560"/>
+              <a:gd name="connsiteY9" fmla="*/ 27432 h 27432"/>
+              <a:gd name="connsiteX10" fmla="*/ 3290011 w 4480560"/>
+              <a:gd name="connsiteY10" fmla="*/ 27432 h 27432"/>
+              <a:gd name="connsiteX11" fmla="*/ 2560320 w 4480560"/>
+              <a:gd name="connsiteY11" fmla="*/ 27432 h 27432"/>
+              <a:gd name="connsiteX12" fmla="*/ 1965046 w 4480560"/>
+              <a:gd name="connsiteY12" fmla="*/ 27432 h 27432"/>
+              <a:gd name="connsiteX13" fmla="*/ 1459382 w 4480560"/>
+              <a:gd name="connsiteY13" fmla="*/ 27432 h 27432"/>
+              <a:gd name="connsiteX14" fmla="*/ 774497 w 4480560"/>
+              <a:gd name="connsiteY14" fmla="*/ 27432 h 27432"/>
+              <a:gd name="connsiteX15" fmla="*/ 0 w 4480560"/>
+              <a:gd name="connsiteY15" fmla="*/ 27432 h 27432"/>
+              <a:gd name="connsiteX16" fmla="*/ 0 w 4480560"/>
+              <a:gd name="connsiteY16" fmla="*/ 0 h 27432"/>
+            </a:gdLst>
+            <a:ahLst/>
+            <a:cxnLst>
+              <a:cxn ang="0">
+                <a:pos x="connsiteX0" y="connsiteY0"/>
+              </a:cxn>
+              <a:cxn ang="0">
+                <a:pos x="connsiteX1" y="connsiteY1"/>
+              </a:cxn>
+              <a:cxn ang="0">
+                <a:pos x="connsiteX2" y="connsiteY2"/>
+              </a:cxn>
+              <a:cxn ang="0">
+                <a:pos x="connsiteX3" y="connsiteY3"/>
+              </a:cxn>
+              <a:cxn ang="0">
+                <a:pos x="connsiteX4" y="connsiteY4"/>
+              </a:cxn>
+              <a:cxn ang="0">
+                <a:pos x="connsiteX5" y="connsiteY5"/>
+              </a:cxn>
+              <a:cxn ang="0">
+                <a:pos x="connsiteX6" y="connsiteY6"/>
+              </a:cxn>
+              <a:cxn ang="0">
+                <a:pos x="connsiteX7" y="connsiteY7"/>
+              </a:cxn>
+              <a:cxn ang="0">
+                <a:pos x="connsiteX8" y="connsiteY8"/>
+              </a:cxn>
+              <a:cxn ang="0">
+                <a:pos x="connsiteX9" y="connsiteY9"/>
+              </a:cxn>
+              <a:cxn ang="0">
+                <a:pos x="connsiteX10" y="connsiteY10"/>
+              </a:cxn>
+              <a:cxn ang="0">
+                <a:pos x="connsiteX11" y="connsiteY11"/>
+              </a:cxn>
+              <a:cxn ang="0">
+                <a:pos x="connsiteX12" y="connsiteY12"/>
+              </a:cxn>
+              <a:cxn ang="0">
+                <a:pos x="connsiteX13" y="connsiteY13"/>
+              </a:cxn>
+              <a:cxn ang="0">
+                <a:pos x="connsiteX14" y="connsiteY14"/>
+              </a:cxn>
+              <a:cxn ang="0">
+                <a:pos x="connsiteX15" y="connsiteY15"/>
+              </a:cxn>
+              <a:cxn ang="0">
+                <a:pos x="connsiteX16" y="connsiteY16"/>
+              </a:cxn>
+            </a:cxnLst>
+            <a:rect l="l" t="t" r="r" b="b"/>
+            <a:pathLst>
+              <a:path w="4480560" h="27432" fill="none" extrusionOk="0">
+                <a:moveTo>
+                  <a:pt x="0" y="0"/>
+                </a:moveTo>
+                <a:cubicBezTo>
+                  <a:pt x="267821" y="8731"/>
+                  <a:pt x="334105" y="2629"/>
+                  <a:pt x="595274" y="0"/>
+                </a:cubicBezTo>
+                <a:cubicBezTo>
+                  <a:pt x="856443" y="-2629"/>
+                  <a:pt x="863808" y="-13353"/>
+                  <a:pt x="1100938" y="0"/>
+                </a:cubicBezTo>
+                <a:cubicBezTo>
+                  <a:pt x="1338068" y="13353"/>
+                  <a:pt x="1431663" y="-25862"/>
+                  <a:pt x="1651406" y="0"/>
+                </a:cubicBezTo>
+                <a:cubicBezTo>
+                  <a:pt x="1871149" y="25862"/>
+                  <a:pt x="2173163" y="23827"/>
+                  <a:pt x="2336292" y="0"/>
+                </a:cubicBezTo>
+                <a:cubicBezTo>
+                  <a:pt x="2499421" y="-23827"/>
+                  <a:pt x="2720589" y="28148"/>
+                  <a:pt x="2931566" y="0"/>
+                </a:cubicBezTo>
+                <a:cubicBezTo>
+                  <a:pt x="3142543" y="-28148"/>
+                  <a:pt x="3323630" y="27022"/>
+                  <a:pt x="3482035" y="0"/>
+                </a:cubicBezTo>
+                <a:cubicBezTo>
+                  <a:pt x="3640440" y="-27022"/>
+                  <a:pt x="4012110" y="-20118"/>
+                  <a:pt x="4480560" y="0"/>
+                </a:cubicBezTo>
+                <a:cubicBezTo>
+                  <a:pt x="4479587" y="8304"/>
+                  <a:pt x="4480082" y="21512"/>
+                  <a:pt x="4480560" y="27432"/>
+                </a:cubicBezTo>
+                <a:cubicBezTo>
+                  <a:pt x="4314132" y="24068"/>
+                  <a:pt x="4028383" y="45776"/>
+                  <a:pt x="3840480" y="27432"/>
+                </a:cubicBezTo>
+                <a:cubicBezTo>
+                  <a:pt x="3652577" y="9088"/>
+                  <a:pt x="3547615" y="11992"/>
+                  <a:pt x="3290011" y="27432"/>
+                </a:cubicBezTo>
+                <a:cubicBezTo>
+                  <a:pt x="3032407" y="42872"/>
+                  <a:pt x="2830268" y="17863"/>
+                  <a:pt x="2560320" y="27432"/>
+                </a:cubicBezTo>
+                <a:cubicBezTo>
+                  <a:pt x="2290372" y="37001"/>
+                  <a:pt x="2147422" y="15872"/>
+                  <a:pt x="1965046" y="27432"/>
+                </a:cubicBezTo>
+                <a:cubicBezTo>
+                  <a:pt x="1782670" y="38992"/>
+                  <a:pt x="1689791" y="49824"/>
+                  <a:pt x="1459382" y="27432"/>
+                </a:cubicBezTo>
+                <a:cubicBezTo>
+                  <a:pt x="1228973" y="5040"/>
+                  <a:pt x="915486" y="45645"/>
+                  <a:pt x="774497" y="27432"/>
+                </a:cubicBezTo>
+                <a:cubicBezTo>
+                  <a:pt x="633508" y="9219"/>
+                  <a:pt x="361442" y="-1963"/>
+                  <a:pt x="0" y="27432"/>
+                </a:cubicBezTo>
+                <a:cubicBezTo>
+                  <a:pt x="-1048" y="14992"/>
+                  <a:pt x="-1120" y="7447"/>
+                  <a:pt x="0" y="0"/>
+                </a:cubicBezTo>
+                <a:close/>
+              </a:path>
+              <a:path w="4480560" h="27432" stroke="0" extrusionOk="0">
+                <a:moveTo>
+                  <a:pt x="0" y="0"/>
+                </a:moveTo>
+                <a:cubicBezTo>
+                  <a:pt x="285465" y="225"/>
+                  <a:pt x="322691" y="16223"/>
+                  <a:pt x="595274" y="0"/>
+                </a:cubicBezTo>
+                <a:cubicBezTo>
+                  <a:pt x="867857" y="-16223"/>
+                  <a:pt x="989129" y="-11242"/>
+                  <a:pt x="1100938" y="0"/>
+                </a:cubicBezTo>
+                <a:cubicBezTo>
+                  <a:pt x="1212747" y="11242"/>
+                  <a:pt x="1574350" y="-36410"/>
+                  <a:pt x="1830629" y="0"/>
+                </a:cubicBezTo>
+                <a:cubicBezTo>
+                  <a:pt x="2086908" y="36410"/>
+                  <a:pt x="2180922" y="4645"/>
+                  <a:pt x="2425903" y="0"/>
+                </a:cubicBezTo>
+                <a:cubicBezTo>
+                  <a:pt x="2670884" y="-4645"/>
+                  <a:pt x="2782024" y="22929"/>
+                  <a:pt x="3021178" y="0"/>
+                </a:cubicBezTo>
+                <a:cubicBezTo>
+                  <a:pt x="3260332" y="-22929"/>
+                  <a:pt x="3456982" y="-1586"/>
+                  <a:pt x="3750869" y="0"/>
+                </a:cubicBezTo>
+                <a:cubicBezTo>
+                  <a:pt x="4044756" y="1586"/>
+                  <a:pt x="4302726" y="17043"/>
+                  <a:pt x="4480560" y="0"/>
+                </a:cubicBezTo>
+                <a:cubicBezTo>
+                  <a:pt x="4481045" y="9333"/>
+                  <a:pt x="4481838" y="19699"/>
+                  <a:pt x="4480560" y="27432"/>
+                </a:cubicBezTo>
+                <a:cubicBezTo>
+                  <a:pt x="4279652" y="2294"/>
+                  <a:pt x="4200762" y="50710"/>
+                  <a:pt x="3930091" y="27432"/>
+                </a:cubicBezTo>
+                <a:cubicBezTo>
+                  <a:pt x="3659420" y="4154"/>
+                  <a:pt x="3456052" y="31438"/>
+                  <a:pt x="3290011" y="27432"/>
+                </a:cubicBezTo>
+                <a:cubicBezTo>
+                  <a:pt x="3123970" y="23426"/>
+                  <a:pt x="2882392" y="41962"/>
+                  <a:pt x="2649931" y="27432"/>
+                </a:cubicBezTo>
+                <a:cubicBezTo>
+                  <a:pt x="2417470" y="12902"/>
+                  <a:pt x="2238426" y="16481"/>
+                  <a:pt x="2054657" y="27432"/>
+                </a:cubicBezTo>
+                <a:cubicBezTo>
+                  <a:pt x="1870888" y="38383"/>
+                  <a:pt x="1566368" y="54184"/>
+                  <a:pt x="1324966" y="27432"/>
+                </a:cubicBezTo>
+                <a:cubicBezTo>
+                  <a:pt x="1083564" y="680"/>
+                  <a:pt x="787410" y="20090"/>
+                  <a:pt x="595274" y="27432"/>
+                </a:cubicBezTo>
+                <a:cubicBezTo>
+                  <a:pt x="403138" y="34774"/>
+                  <a:pt x="169622" y="19643"/>
+                  <a:pt x="0" y="27432"/>
+                </a:cubicBezTo>
+                <a:cubicBezTo>
+                  <a:pt x="211" y="18145"/>
+                  <a:pt x="120" y="6480"/>
+                  <a:pt x="0" y="0"/>
+                </a:cubicBezTo>
+                <a:close/>
+              </a:path>
+            </a:pathLst>
+          </a:custGeom>
+          <a:solidFill>
+            <a:schemeClr val="accent1"/>
+          </a:solidFill>
+          <a:ln w="41275" cap="rnd">
+            <a:solidFill>
+              <a:schemeClr val="accent1"/>
+            </a:solidFill>
+            <a:round/>
+            <a:extLst>
+              <a:ext uri="{C807C97D-BFC1-408E-A445-0C87EB9F89A2}">
+                <ask:lineSketchStyleProps xmlns:ask="http://schemas.microsoft.com/office/drawing/2018/sketchyshapes" sd="1219033472">
+                  <a:prstGeom prst="rect">
+                    <a:avLst/>
+                  </a:prstGeom>
+                  <ask:type>
+                    <ask:lineSketchFreehand/>
+                  </ask:type>
+                </ask:lineSketchStyleProps>
+              </a:ext>
+            </a:extLst>
+          </a:ln>
+        </p:spPr>
+        <p:style>
+          <a:lnRef idx="2">
+            <a:schemeClr val="accent1">
+              <a:shade val="50000"/>
+            </a:schemeClr>
+          </a:lnRef>
+          <a:fillRef idx="1">
+            <a:schemeClr val="accent1"/>
+          </a:fillRef>
+          <a:effectRef idx="0">
+            <a:schemeClr val="accent1"/>
+          </a:effectRef>
+          <a:fontRef idx="minor">
+            <a:schemeClr val="lt1"/>
+          </a:fontRef>
+        </p:style>
+        <p:txBody>
+          <a:bodyPr rtlCol="0" anchor="ctr"/>
+          <a:lstStyle/>
+          <a:p>
+            <a:pPr algn="ctr"/>
+            <a:endParaRPr lang="en-US"/>
           </a:p>
         </p:txBody>
       </p:sp>
@@ -7547,9 +7965,16 @@
             <p:ph idx="1"/>
           </p:nvPr>
         </p:nvSpPr>
-        <p:spPr/>
+        <p:spPr>
+          <a:xfrm>
+            <a:off x="5298595" y="552091"/>
+            <a:ext cx="6052158" cy="5431536"/>
+          </a:xfrm>
+        </p:spPr>
         <p:txBody>
-          <a:bodyPr/>
+          <a:bodyPr anchor="ctr">
+            <a:normAutofit/>
+          </a:bodyPr>
           <a:lstStyle/>
           <a:p>
             <a:r>
@@ -7597,6 +8022,14 @@
 <file path=ppt/slides/slide3.xml><?xml version="1.0" encoding="utf-8"?>
 <p:sld xmlns:a="http://schemas.openxmlformats.org/drawingml/2006/main" xmlns:r="http://schemas.openxmlformats.org/officeDocument/2006/relationships" xmlns:p="http://schemas.openxmlformats.org/presentationml/2006/main">
   <p:cSld>
+    <p:bg>
+      <p:bgPr>
+        <a:solidFill>
+          <a:schemeClr val="bg1"/>
+        </a:solidFill>
+        <a:effectLst/>
+      </p:bgPr>
+    </p:bg>
     <p:spTree>
       <p:nvGrpSpPr>
         <p:cNvPr id="1" name=""/>
@@ -7611,6 +8044,66 @@
           <a:chExt cx="0" cy="0"/>
         </a:xfrm>
       </p:grpSpPr>
+      <p:sp useBgFill="1">
+        <p:nvSpPr>
+          <p:cNvPr id="8" name="Rectangle 7">
+            <a:extLst>
+              <a:ext uri="{FF2B5EF4-FFF2-40B4-BE49-F238E27FC236}">
+                <a16:creationId xmlns:a16="http://schemas.microsoft.com/office/drawing/2014/main" id="{777A147A-9ED8-46B4-8660-1B3C2AA880B5}"/>
+              </a:ext>
+              <a:ext uri="{C183D7F6-B498-43B3-948B-1728B52AA6E4}">
+                <adec:decorative xmlns:adec="http://schemas.microsoft.com/office/drawing/2017/decorative" val="1"/>
+              </a:ext>
+            </a:extLst>
+          </p:cNvPr>
+          <p:cNvSpPr>
+            <a:spLocks noGrp="1" noRot="1" noChangeAspect="1" noMove="1" noResize="1" noEditPoints="1" noAdjustHandles="1" noChangeArrowheads="1" noChangeShapeType="1" noTextEdit="1"/>
+          </p:cNvSpPr>
+          <p:nvPr>
+            <p:extLst>
+              <p:ext uri="{386F3935-93C4-4BCD-93E2-E3B085C9AB24}">
+                <p16:designElem xmlns:p16="http://schemas.microsoft.com/office/powerpoint/2015/main" val="1"/>
+              </p:ext>
+            </p:extLst>
+          </p:nvPr>
+        </p:nvSpPr>
+        <p:spPr>
+          <a:xfrm>
+            <a:off x="0" y="0"/>
+            <a:ext cx="12188952" cy="6858000"/>
+          </a:xfrm>
+          <a:prstGeom prst="rect">
+            <a:avLst/>
+          </a:prstGeom>
+          <a:ln>
+            <a:noFill/>
+          </a:ln>
+        </p:spPr>
+        <p:style>
+          <a:lnRef idx="2">
+            <a:schemeClr val="accent1">
+              <a:shade val="50000"/>
+            </a:schemeClr>
+          </a:lnRef>
+          <a:fillRef idx="1">
+            <a:schemeClr val="accent1"/>
+          </a:fillRef>
+          <a:effectRef idx="0">
+            <a:schemeClr val="accent1"/>
+          </a:effectRef>
+          <a:fontRef idx="minor">
+            <a:schemeClr val="lt1"/>
+          </a:fontRef>
+        </p:style>
+        <p:txBody>
+          <a:bodyPr rtlCol="0" anchor="ctr"/>
+          <a:lstStyle/>
+          <a:p>
+            <a:pPr algn="ctr"/>
+            <a:endParaRPr lang="en-US"/>
+          </a:p>
+        </p:txBody>
+      </p:sp>
       <p:sp>
         <p:nvSpPr>
           <p:cNvPr id="2" name="Titel 1">
@@ -7627,15 +8120,365 @@
             <p:ph type="title"/>
           </p:nvPr>
         </p:nvSpPr>
-        <p:spPr/>
+        <p:spPr>
+          <a:xfrm>
+            <a:off x="841248" y="548640"/>
+            <a:ext cx="3419540" cy="5431536"/>
+          </a:xfrm>
+        </p:spPr>
         <p:txBody>
-          <a:bodyPr/>
+          <a:bodyPr>
+            <a:normAutofit/>
+          </a:bodyPr>
           <a:lstStyle/>
           <a:p>
             <a:r>
-              <a:rPr lang="de-DE" dirty="0"/>
+              <a:rPr lang="de-DE" sz="6000"/>
               <a:t>Was wollen wir noch erreichen</a:t>
             </a:r>
+          </a:p>
+        </p:txBody>
+      </p:sp>
+      <p:sp>
+        <p:nvSpPr>
+          <p:cNvPr id="10" name="Rectangle 6">
+            <a:extLst>
+              <a:ext uri="{FF2B5EF4-FFF2-40B4-BE49-F238E27FC236}">
+                <a16:creationId xmlns:a16="http://schemas.microsoft.com/office/drawing/2014/main" id="{5D6C15A0-C087-4593-8414-2B4EC1CDC3DE}"/>
+              </a:ext>
+              <a:ext uri="{C183D7F6-B498-43B3-948B-1728B52AA6E4}">
+                <adec:decorative xmlns:adec="http://schemas.microsoft.com/office/drawing/2017/decorative" val="1"/>
+              </a:ext>
+            </a:extLst>
+          </p:cNvPr>
+          <p:cNvSpPr>
+            <a:spLocks noGrp="1" noRot="1" noChangeAspect="1" noMove="1" noResize="1" noEditPoints="1" noAdjustHandles="1" noChangeArrowheads="1" noChangeShapeType="1" noTextEdit="1"/>
+          </p:cNvSpPr>
+          <p:nvPr>
+            <p:extLst>
+              <p:ext uri="{386F3935-93C4-4BCD-93E2-E3B085C9AB24}">
+                <p16:designElem xmlns:p16="http://schemas.microsoft.com/office/powerpoint/2015/main" val="1"/>
+              </p:ext>
+            </p:extLst>
+          </p:nvPr>
+        </p:nvSpPr>
+        <p:spPr>
+          <a:xfrm rot="5400000">
+            <a:off x="2539411" y="3254143"/>
+            <a:ext cx="4480560" cy="27432"/>
+          </a:xfrm>
+          <a:custGeom>
+            <a:avLst/>
+            <a:gdLst>
+              <a:gd name="connsiteX0" fmla="*/ 0 w 4480560"/>
+              <a:gd name="connsiteY0" fmla="*/ 0 h 27432"/>
+              <a:gd name="connsiteX1" fmla="*/ 595274 w 4480560"/>
+              <a:gd name="connsiteY1" fmla="*/ 0 h 27432"/>
+              <a:gd name="connsiteX2" fmla="*/ 1100938 w 4480560"/>
+              <a:gd name="connsiteY2" fmla="*/ 0 h 27432"/>
+              <a:gd name="connsiteX3" fmla="*/ 1651406 w 4480560"/>
+              <a:gd name="connsiteY3" fmla="*/ 0 h 27432"/>
+              <a:gd name="connsiteX4" fmla="*/ 2336292 w 4480560"/>
+              <a:gd name="connsiteY4" fmla="*/ 0 h 27432"/>
+              <a:gd name="connsiteX5" fmla="*/ 2931566 w 4480560"/>
+              <a:gd name="connsiteY5" fmla="*/ 0 h 27432"/>
+              <a:gd name="connsiteX6" fmla="*/ 3482035 w 4480560"/>
+              <a:gd name="connsiteY6" fmla="*/ 0 h 27432"/>
+              <a:gd name="connsiteX7" fmla="*/ 4480560 w 4480560"/>
+              <a:gd name="connsiteY7" fmla="*/ 0 h 27432"/>
+              <a:gd name="connsiteX8" fmla="*/ 4480560 w 4480560"/>
+              <a:gd name="connsiteY8" fmla="*/ 27432 h 27432"/>
+              <a:gd name="connsiteX9" fmla="*/ 3840480 w 4480560"/>
+              <a:gd name="connsiteY9" fmla="*/ 27432 h 27432"/>
+              <a:gd name="connsiteX10" fmla="*/ 3290011 w 4480560"/>
+              <a:gd name="connsiteY10" fmla="*/ 27432 h 27432"/>
+              <a:gd name="connsiteX11" fmla="*/ 2560320 w 4480560"/>
+              <a:gd name="connsiteY11" fmla="*/ 27432 h 27432"/>
+              <a:gd name="connsiteX12" fmla="*/ 1965046 w 4480560"/>
+              <a:gd name="connsiteY12" fmla="*/ 27432 h 27432"/>
+              <a:gd name="connsiteX13" fmla="*/ 1459382 w 4480560"/>
+              <a:gd name="connsiteY13" fmla="*/ 27432 h 27432"/>
+              <a:gd name="connsiteX14" fmla="*/ 774497 w 4480560"/>
+              <a:gd name="connsiteY14" fmla="*/ 27432 h 27432"/>
+              <a:gd name="connsiteX15" fmla="*/ 0 w 4480560"/>
+              <a:gd name="connsiteY15" fmla="*/ 27432 h 27432"/>
+              <a:gd name="connsiteX16" fmla="*/ 0 w 4480560"/>
+              <a:gd name="connsiteY16" fmla="*/ 0 h 27432"/>
+            </a:gdLst>
+            <a:ahLst/>
+            <a:cxnLst>
+              <a:cxn ang="0">
+                <a:pos x="connsiteX0" y="connsiteY0"/>
+              </a:cxn>
+              <a:cxn ang="0">
+                <a:pos x="connsiteX1" y="connsiteY1"/>
+              </a:cxn>
+              <a:cxn ang="0">
+                <a:pos x="connsiteX2" y="connsiteY2"/>
+              </a:cxn>
+              <a:cxn ang="0">
+                <a:pos x="connsiteX3" y="connsiteY3"/>
+              </a:cxn>
+              <a:cxn ang="0">
+                <a:pos x="connsiteX4" y="connsiteY4"/>
+              </a:cxn>
+              <a:cxn ang="0">
+                <a:pos x="connsiteX5" y="connsiteY5"/>
+              </a:cxn>
+              <a:cxn ang="0">
+                <a:pos x="connsiteX6" y="connsiteY6"/>
+              </a:cxn>
+              <a:cxn ang="0">
+                <a:pos x="connsiteX7" y="connsiteY7"/>
+              </a:cxn>
+              <a:cxn ang="0">
+                <a:pos x="connsiteX8" y="connsiteY8"/>
+              </a:cxn>
+              <a:cxn ang="0">
+                <a:pos x="connsiteX9" y="connsiteY9"/>
+              </a:cxn>
+              <a:cxn ang="0">
+                <a:pos x="connsiteX10" y="connsiteY10"/>
+              </a:cxn>
+              <a:cxn ang="0">
+                <a:pos x="connsiteX11" y="connsiteY11"/>
+              </a:cxn>
+              <a:cxn ang="0">
+                <a:pos x="connsiteX12" y="connsiteY12"/>
+              </a:cxn>
+              <a:cxn ang="0">
+                <a:pos x="connsiteX13" y="connsiteY13"/>
+              </a:cxn>
+              <a:cxn ang="0">
+                <a:pos x="connsiteX14" y="connsiteY14"/>
+              </a:cxn>
+              <a:cxn ang="0">
+                <a:pos x="connsiteX15" y="connsiteY15"/>
+              </a:cxn>
+              <a:cxn ang="0">
+                <a:pos x="connsiteX16" y="connsiteY16"/>
+              </a:cxn>
+            </a:cxnLst>
+            <a:rect l="l" t="t" r="r" b="b"/>
+            <a:pathLst>
+              <a:path w="4480560" h="27432" fill="none" extrusionOk="0">
+                <a:moveTo>
+                  <a:pt x="0" y="0"/>
+                </a:moveTo>
+                <a:cubicBezTo>
+                  <a:pt x="267821" y="8731"/>
+                  <a:pt x="334105" y="2629"/>
+                  <a:pt x="595274" y="0"/>
+                </a:cubicBezTo>
+                <a:cubicBezTo>
+                  <a:pt x="856443" y="-2629"/>
+                  <a:pt x="863808" y="-13353"/>
+                  <a:pt x="1100938" y="0"/>
+                </a:cubicBezTo>
+                <a:cubicBezTo>
+                  <a:pt x="1338068" y="13353"/>
+                  <a:pt x="1431663" y="-25862"/>
+                  <a:pt x="1651406" y="0"/>
+                </a:cubicBezTo>
+                <a:cubicBezTo>
+                  <a:pt x="1871149" y="25862"/>
+                  <a:pt x="2173163" y="23827"/>
+                  <a:pt x="2336292" y="0"/>
+                </a:cubicBezTo>
+                <a:cubicBezTo>
+                  <a:pt x="2499421" y="-23827"/>
+                  <a:pt x="2720589" y="28148"/>
+                  <a:pt x="2931566" y="0"/>
+                </a:cubicBezTo>
+                <a:cubicBezTo>
+                  <a:pt x="3142543" y="-28148"/>
+                  <a:pt x="3323630" y="27022"/>
+                  <a:pt x="3482035" y="0"/>
+                </a:cubicBezTo>
+                <a:cubicBezTo>
+                  <a:pt x="3640440" y="-27022"/>
+                  <a:pt x="4012110" y="-20118"/>
+                  <a:pt x="4480560" y="0"/>
+                </a:cubicBezTo>
+                <a:cubicBezTo>
+                  <a:pt x="4479587" y="8304"/>
+                  <a:pt x="4480082" y="21512"/>
+                  <a:pt x="4480560" y="27432"/>
+                </a:cubicBezTo>
+                <a:cubicBezTo>
+                  <a:pt x="4314132" y="24068"/>
+                  <a:pt x="4028383" y="45776"/>
+                  <a:pt x="3840480" y="27432"/>
+                </a:cubicBezTo>
+                <a:cubicBezTo>
+                  <a:pt x="3652577" y="9088"/>
+                  <a:pt x="3547615" y="11992"/>
+                  <a:pt x="3290011" y="27432"/>
+                </a:cubicBezTo>
+                <a:cubicBezTo>
+                  <a:pt x="3032407" y="42872"/>
+                  <a:pt x="2830268" y="17863"/>
+                  <a:pt x="2560320" y="27432"/>
+                </a:cubicBezTo>
+                <a:cubicBezTo>
+                  <a:pt x="2290372" y="37001"/>
+                  <a:pt x="2147422" y="15872"/>
+                  <a:pt x="1965046" y="27432"/>
+                </a:cubicBezTo>
+                <a:cubicBezTo>
+                  <a:pt x="1782670" y="38992"/>
+                  <a:pt x="1689791" y="49824"/>
+                  <a:pt x="1459382" y="27432"/>
+                </a:cubicBezTo>
+                <a:cubicBezTo>
+                  <a:pt x="1228973" y="5040"/>
+                  <a:pt x="915486" y="45645"/>
+                  <a:pt x="774497" y="27432"/>
+                </a:cubicBezTo>
+                <a:cubicBezTo>
+                  <a:pt x="633508" y="9219"/>
+                  <a:pt x="361442" y="-1963"/>
+                  <a:pt x="0" y="27432"/>
+                </a:cubicBezTo>
+                <a:cubicBezTo>
+                  <a:pt x="-1048" y="14992"/>
+                  <a:pt x="-1120" y="7447"/>
+                  <a:pt x="0" y="0"/>
+                </a:cubicBezTo>
+                <a:close/>
+              </a:path>
+              <a:path w="4480560" h="27432" stroke="0" extrusionOk="0">
+                <a:moveTo>
+                  <a:pt x="0" y="0"/>
+                </a:moveTo>
+                <a:cubicBezTo>
+                  <a:pt x="285465" y="225"/>
+                  <a:pt x="322691" y="16223"/>
+                  <a:pt x="595274" y="0"/>
+                </a:cubicBezTo>
+                <a:cubicBezTo>
+                  <a:pt x="867857" y="-16223"/>
+                  <a:pt x="989129" y="-11242"/>
+                  <a:pt x="1100938" y="0"/>
+                </a:cubicBezTo>
+                <a:cubicBezTo>
+                  <a:pt x="1212747" y="11242"/>
+                  <a:pt x="1574350" y="-36410"/>
+                  <a:pt x="1830629" y="0"/>
+                </a:cubicBezTo>
+                <a:cubicBezTo>
+                  <a:pt x="2086908" y="36410"/>
+                  <a:pt x="2180922" y="4645"/>
+                  <a:pt x="2425903" y="0"/>
+                </a:cubicBezTo>
+                <a:cubicBezTo>
+                  <a:pt x="2670884" y="-4645"/>
+                  <a:pt x="2782024" y="22929"/>
+                  <a:pt x="3021178" y="0"/>
+                </a:cubicBezTo>
+                <a:cubicBezTo>
+                  <a:pt x="3260332" y="-22929"/>
+                  <a:pt x="3456982" y="-1586"/>
+                  <a:pt x="3750869" y="0"/>
+                </a:cubicBezTo>
+                <a:cubicBezTo>
+                  <a:pt x="4044756" y="1586"/>
+                  <a:pt x="4302726" y="17043"/>
+                  <a:pt x="4480560" y="0"/>
+                </a:cubicBezTo>
+                <a:cubicBezTo>
+                  <a:pt x="4481045" y="9333"/>
+                  <a:pt x="4481838" y="19699"/>
+                  <a:pt x="4480560" y="27432"/>
+                </a:cubicBezTo>
+                <a:cubicBezTo>
+                  <a:pt x="4279652" y="2294"/>
+                  <a:pt x="4200762" y="50710"/>
+                  <a:pt x="3930091" y="27432"/>
+                </a:cubicBezTo>
+                <a:cubicBezTo>
+                  <a:pt x="3659420" y="4154"/>
+                  <a:pt x="3456052" y="31438"/>
+                  <a:pt x="3290011" y="27432"/>
+                </a:cubicBezTo>
+                <a:cubicBezTo>
+                  <a:pt x="3123970" y="23426"/>
+                  <a:pt x="2882392" y="41962"/>
+                  <a:pt x="2649931" y="27432"/>
+                </a:cubicBezTo>
+                <a:cubicBezTo>
+                  <a:pt x="2417470" y="12902"/>
+                  <a:pt x="2238426" y="16481"/>
+                  <a:pt x="2054657" y="27432"/>
+                </a:cubicBezTo>
+                <a:cubicBezTo>
+                  <a:pt x="1870888" y="38383"/>
+                  <a:pt x="1566368" y="54184"/>
+                  <a:pt x="1324966" y="27432"/>
+                </a:cubicBezTo>
+                <a:cubicBezTo>
+                  <a:pt x="1083564" y="680"/>
+                  <a:pt x="787410" y="20090"/>
+                  <a:pt x="595274" y="27432"/>
+                </a:cubicBezTo>
+                <a:cubicBezTo>
+                  <a:pt x="403138" y="34774"/>
+                  <a:pt x="169622" y="19643"/>
+                  <a:pt x="0" y="27432"/>
+                </a:cubicBezTo>
+                <a:cubicBezTo>
+                  <a:pt x="211" y="18145"/>
+                  <a:pt x="120" y="6480"/>
+                  <a:pt x="0" y="0"/>
+                </a:cubicBezTo>
+                <a:close/>
+              </a:path>
+            </a:pathLst>
+          </a:custGeom>
+          <a:solidFill>
+            <a:schemeClr val="accent1"/>
+          </a:solidFill>
+          <a:ln w="41275" cap="rnd">
+            <a:solidFill>
+              <a:schemeClr val="accent1"/>
+            </a:solidFill>
+            <a:round/>
+            <a:extLst>
+              <a:ext uri="{C807C97D-BFC1-408E-A445-0C87EB9F89A2}">
+                <ask:lineSketchStyleProps xmlns:ask="http://schemas.microsoft.com/office/drawing/2018/sketchyshapes" sd="1219033472">
+                  <a:prstGeom prst="rect">
+                    <a:avLst/>
+                  </a:prstGeom>
+                  <ask:type>
+                    <ask:lineSketchFreehand/>
+                  </ask:type>
+                </ask:lineSketchStyleProps>
+              </a:ext>
+            </a:extLst>
+          </a:ln>
+        </p:spPr>
+        <p:style>
+          <a:lnRef idx="2">
+            <a:schemeClr val="accent1">
+              <a:shade val="50000"/>
+            </a:schemeClr>
+          </a:lnRef>
+          <a:fillRef idx="1">
+            <a:schemeClr val="accent1"/>
+          </a:fillRef>
+          <a:effectRef idx="0">
+            <a:schemeClr val="accent1"/>
+          </a:effectRef>
+          <a:fontRef idx="minor">
+            <a:schemeClr val="lt1"/>
+          </a:fontRef>
+        </p:style>
+        <p:txBody>
+          <a:bodyPr rtlCol="0" anchor="ctr"/>
+          <a:lstStyle/>
+          <a:p>
+            <a:pPr algn="ctr"/>
+            <a:endParaRPr lang="en-US"/>
           </a:p>
         </p:txBody>
       </p:sp>
@@ -7655,9 +8498,16 @@
             <p:ph idx="1"/>
           </p:nvPr>
         </p:nvSpPr>
-        <p:spPr/>
+        <p:spPr>
+          <a:xfrm>
+            <a:off x="5298595" y="552091"/>
+            <a:ext cx="6052158" cy="5431536"/>
+          </a:xfrm>
+        </p:spPr>
         <p:txBody>
-          <a:bodyPr/>
+          <a:bodyPr anchor="ctr">
+            <a:normAutofit/>
+          </a:bodyPr>
           <a:lstStyle/>
           <a:p>
             <a:r>
@@ -7685,12 +8535,112 @@
   <p:clrMapOvr>
     <a:masterClrMapping/>
   </p:clrMapOvr>
+  <p:timing>
+    <p:tnLst>
+      <p:par>
+        <p:cTn id="1" dur="indefinite" restart="never" nodeType="tmRoot">
+          <p:childTnLst>
+            <p:seq concurrent="1" nextAc="seek">
+              <p:cTn id="2" dur="indefinite" nodeType="mainSeq">
+                <p:childTnLst>
+                  <p:par>
+                    <p:cTn id="3" fill="hold">
+                      <p:stCondLst>
+                        <p:cond delay="indefinite"/>
+                        <p:cond evt="onBegin" delay="0">
+                          <p:tn val="2"/>
+                        </p:cond>
+                      </p:stCondLst>
+                      <p:childTnLst>
+                        <p:par>
+                          <p:cTn id="4" fill="hold">
+                            <p:stCondLst>
+                              <p:cond delay="0"/>
+                            </p:stCondLst>
+                            <p:childTnLst>
+                              <p:par>
+                                <p:cTn id="5" presetID="10" presetClass="entr" presetSubtype="0" fill="hold" grpId="0" nodeType="withEffect">
+                                  <p:stCondLst>
+                                    <p:cond delay="500"/>
+                                  </p:stCondLst>
+                                  <p:iterate type="wd">
+                                    <p:tmPct val="15000"/>
+                                  </p:iterate>
+                                  <p:childTnLst>
+                                    <p:set>
+                                      <p:cBhvr>
+                                        <p:cTn id="6" dur="1" fill="hold">
+                                          <p:stCondLst>
+                                            <p:cond delay="0"/>
+                                          </p:stCondLst>
+                                        </p:cTn>
+                                        <p:tgtEl>
+                                          <p:spTgt spid="2"/>
+                                        </p:tgtEl>
+                                        <p:attrNameLst>
+                                          <p:attrName>style.visibility</p:attrName>
+                                        </p:attrNameLst>
+                                      </p:cBhvr>
+                                      <p:to>
+                                        <p:strVal val="visible"/>
+                                      </p:to>
+                                    </p:set>
+                                    <p:animEffect transition="in" filter="fade">
+                                      <p:cBhvr>
+                                        <p:cTn id="7" dur="1000"/>
+                                        <p:tgtEl>
+                                          <p:spTgt spid="2"/>
+                                        </p:tgtEl>
+                                      </p:cBhvr>
+                                    </p:animEffect>
+                                  </p:childTnLst>
+                                </p:cTn>
+                              </p:par>
+                            </p:childTnLst>
+                          </p:cTn>
+                        </p:par>
+                      </p:childTnLst>
+                    </p:cTn>
+                  </p:par>
+                </p:childTnLst>
+              </p:cTn>
+              <p:prevCondLst>
+                <p:cond evt="onPrev" delay="0">
+                  <p:tgtEl>
+                    <p:sldTgt/>
+                  </p:tgtEl>
+                </p:cond>
+              </p:prevCondLst>
+              <p:nextCondLst>
+                <p:cond evt="onNext" delay="0">
+                  <p:tgtEl>
+                    <p:sldTgt/>
+                  </p:tgtEl>
+                </p:cond>
+              </p:nextCondLst>
+            </p:seq>
+          </p:childTnLst>
+        </p:cTn>
+      </p:par>
+    </p:tnLst>
+    <p:bldLst>
+      <p:bldP spid="2" grpId="0"/>
+    </p:bldLst>
+  </p:timing>
 </p:sld>
 </file>
 
 <file path=ppt/slides/slide4.xml><?xml version="1.0" encoding="utf-8"?>
 <p:sld xmlns:a="http://schemas.openxmlformats.org/drawingml/2006/main" xmlns:r="http://schemas.openxmlformats.org/officeDocument/2006/relationships" xmlns:p="http://schemas.openxmlformats.org/presentationml/2006/main">
   <p:cSld>
+    <p:bg>
+      <p:bgPr>
+        <a:solidFill>
+          <a:schemeClr val="bg1"/>
+        </a:solidFill>
+        <a:effectLst/>
+      </p:bgPr>
+    </p:bg>
     <p:spTree>
       <p:nvGrpSpPr>
         <p:cNvPr id="1" name=""/>
@@ -7705,6 +8655,66 @@
           <a:chExt cx="0" cy="0"/>
         </a:xfrm>
       </p:grpSpPr>
+      <p:sp useBgFill="1">
+        <p:nvSpPr>
+          <p:cNvPr id="8" name="Rectangle 7">
+            <a:extLst>
+              <a:ext uri="{FF2B5EF4-FFF2-40B4-BE49-F238E27FC236}">
+                <a16:creationId xmlns:a16="http://schemas.microsoft.com/office/drawing/2014/main" id="{777A147A-9ED8-46B4-8660-1B3C2AA880B5}"/>
+              </a:ext>
+              <a:ext uri="{C183D7F6-B498-43B3-948B-1728B52AA6E4}">
+                <adec:decorative xmlns:adec="http://schemas.microsoft.com/office/drawing/2017/decorative" val="1"/>
+              </a:ext>
+            </a:extLst>
+          </p:cNvPr>
+          <p:cNvSpPr>
+            <a:spLocks noGrp="1" noRot="1" noChangeAspect="1" noMove="1" noResize="1" noEditPoints="1" noAdjustHandles="1" noChangeArrowheads="1" noChangeShapeType="1" noTextEdit="1"/>
+          </p:cNvSpPr>
+          <p:nvPr>
+            <p:extLst>
+              <p:ext uri="{386F3935-93C4-4BCD-93E2-E3B085C9AB24}">
+                <p16:designElem xmlns:p16="http://schemas.microsoft.com/office/powerpoint/2015/main" val="1"/>
+              </p:ext>
+            </p:extLst>
+          </p:nvPr>
+        </p:nvSpPr>
+        <p:spPr>
+          <a:xfrm>
+            <a:off x="0" y="0"/>
+            <a:ext cx="12188952" cy="6858000"/>
+          </a:xfrm>
+          <a:prstGeom prst="rect">
+            <a:avLst/>
+          </a:prstGeom>
+          <a:ln>
+            <a:noFill/>
+          </a:ln>
+        </p:spPr>
+        <p:style>
+          <a:lnRef idx="2">
+            <a:schemeClr val="accent1">
+              <a:shade val="50000"/>
+            </a:schemeClr>
+          </a:lnRef>
+          <a:fillRef idx="1">
+            <a:schemeClr val="accent1"/>
+          </a:fillRef>
+          <a:effectRef idx="0">
+            <a:schemeClr val="accent1"/>
+          </a:effectRef>
+          <a:fontRef idx="minor">
+            <a:schemeClr val="lt1"/>
+          </a:fontRef>
+        </p:style>
+        <p:txBody>
+          <a:bodyPr rtlCol="0" anchor="ctr"/>
+          <a:lstStyle/>
+          <a:p>
+            <a:pPr algn="ctr"/>
+            <a:endParaRPr lang="en-US"/>
+          </a:p>
+        </p:txBody>
+      </p:sp>
       <p:sp>
         <p:nvSpPr>
           <p:cNvPr id="2" name="Titel 1">
@@ -7721,31 +8731,365 @@
             <p:ph type="title"/>
           </p:nvPr>
         </p:nvSpPr>
-        <p:spPr/>
+        <p:spPr>
+          <a:xfrm>
+            <a:off x="841248" y="548640"/>
+            <a:ext cx="3419540" cy="5431536"/>
+          </a:xfrm>
+        </p:spPr>
         <p:txBody>
-          <a:bodyPr/>
+          <a:bodyPr>
+            <a:normAutofit/>
+          </a:bodyPr>
           <a:lstStyle/>
           <a:p>
             <a:r>
-              <a:rPr lang="de-DE" dirty="0"/>
-              <a:t>Nice-</a:t>
+              <a:rPr lang="de-DE" sz="6000"/>
+              <a:t>Nice-to-have Features</a:t>
             </a:r>
-            <a:r>
-              <a:rPr lang="de-DE" dirty="0" err="1"/>
-              <a:t>to</a:t>
-            </a:r>
-            <a:r>
-              <a:rPr lang="de-DE" dirty="0"/>
-              <a:t>-</a:t>
-            </a:r>
-            <a:r>
-              <a:rPr lang="de-DE" dirty="0" err="1"/>
-              <a:t>have</a:t>
-            </a:r>
-            <a:r>
-              <a:rPr lang="de-DE" dirty="0"/>
-              <a:t> Features</a:t>
-            </a:r>
+          </a:p>
+        </p:txBody>
+      </p:sp>
+      <p:sp>
+        <p:nvSpPr>
+          <p:cNvPr id="10" name="Rectangle 6">
+            <a:extLst>
+              <a:ext uri="{FF2B5EF4-FFF2-40B4-BE49-F238E27FC236}">
+                <a16:creationId xmlns:a16="http://schemas.microsoft.com/office/drawing/2014/main" id="{5D6C15A0-C087-4593-8414-2B4EC1CDC3DE}"/>
+              </a:ext>
+              <a:ext uri="{C183D7F6-B498-43B3-948B-1728B52AA6E4}">
+                <adec:decorative xmlns:adec="http://schemas.microsoft.com/office/drawing/2017/decorative" val="1"/>
+              </a:ext>
+            </a:extLst>
+          </p:cNvPr>
+          <p:cNvSpPr>
+            <a:spLocks noGrp="1" noRot="1" noChangeAspect="1" noMove="1" noResize="1" noEditPoints="1" noAdjustHandles="1" noChangeArrowheads="1" noChangeShapeType="1" noTextEdit="1"/>
+          </p:cNvSpPr>
+          <p:nvPr>
+            <p:extLst>
+              <p:ext uri="{386F3935-93C4-4BCD-93E2-E3B085C9AB24}">
+                <p16:designElem xmlns:p16="http://schemas.microsoft.com/office/powerpoint/2015/main" val="1"/>
+              </p:ext>
+            </p:extLst>
+          </p:nvPr>
+        </p:nvSpPr>
+        <p:spPr>
+          <a:xfrm rot="5400000">
+            <a:off x="2539411" y="3254143"/>
+            <a:ext cx="4480560" cy="27432"/>
+          </a:xfrm>
+          <a:custGeom>
+            <a:avLst/>
+            <a:gdLst>
+              <a:gd name="connsiteX0" fmla="*/ 0 w 4480560"/>
+              <a:gd name="connsiteY0" fmla="*/ 0 h 27432"/>
+              <a:gd name="connsiteX1" fmla="*/ 595274 w 4480560"/>
+              <a:gd name="connsiteY1" fmla="*/ 0 h 27432"/>
+              <a:gd name="connsiteX2" fmla="*/ 1100938 w 4480560"/>
+              <a:gd name="connsiteY2" fmla="*/ 0 h 27432"/>
+              <a:gd name="connsiteX3" fmla="*/ 1651406 w 4480560"/>
+              <a:gd name="connsiteY3" fmla="*/ 0 h 27432"/>
+              <a:gd name="connsiteX4" fmla="*/ 2336292 w 4480560"/>
+              <a:gd name="connsiteY4" fmla="*/ 0 h 27432"/>
+              <a:gd name="connsiteX5" fmla="*/ 2931566 w 4480560"/>
+              <a:gd name="connsiteY5" fmla="*/ 0 h 27432"/>
+              <a:gd name="connsiteX6" fmla="*/ 3482035 w 4480560"/>
+              <a:gd name="connsiteY6" fmla="*/ 0 h 27432"/>
+              <a:gd name="connsiteX7" fmla="*/ 4480560 w 4480560"/>
+              <a:gd name="connsiteY7" fmla="*/ 0 h 27432"/>
+              <a:gd name="connsiteX8" fmla="*/ 4480560 w 4480560"/>
+              <a:gd name="connsiteY8" fmla="*/ 27432 h 27432"/>
+              <a:gd name="connsiteX9" fmla="*/ 3840480 w 4480560"/>
+              <a:gd name="connsiteY9" fmla="*/ 27432 h 27432"/>
+              <a:gd name="connsiteX10" fmla="*/ 3290011 w 4480560"/>
+              <a:gd name="connsiteY10" fmla="*/ 27432 h 27432"/>
+              <a:gd name="connsiteX11" fmla="*/ 2560320 w 4480560"/>
+              <a:gd name="connsiteY11" fmla="*/ 27432 h 27432"/>
+              <a:gd name="connsiteX12" fmla="*/ 1965046 w 4480560"/>
+              <a:gd name="connsiteY12" fmla="*/ 27432 h 27432"/>
+              <a:gd name="connsiteX13" fmla="*/ 1459382 w 4480560"/>
+              <a:gd name="connsiteY13" fmla="*/ 27432 h 27432"/>
+              <a:gd name="connsiteX14" fmla="*/ 774497 w 4480560"/>
+              <a:gd name="connsiteY14" fmla="*/ 27432 h 27432"/>
+              <a:gd name="connsiteX15" fmla="*/ 0 w 4480560"/>
+              <a:gd name="connsiteY15" fmla="*/ 27432 h 27432"/>
+              <a:gd name="connsiteX16" fmla="*/ 0 w 4480560"/>
+              <a:gd name="connsiteY16" fmla="*/ 0 h 27432"/>
+            </a:gdLst>
+            <a:ahLst/>
+            <a:cxnLst>
+              <a:cxn ang="0">
+                <a:pos x="connsiteX0" y="connsiteY0"/>
+              </a:cxn>
+              <a:cxn ang="0">
+                <a:pos x="connsiteX1" y="connsiteY1"/>
+              </a:cxn>
+              <a:cxn ang="0">
+                <a:pos x="connsiteX2" y="connsiteY2"/>
+              </a:cxn>
+              <a:cxn ang="0">
+                <a:pos x="connsiteX3" y="connsiteY3"/>
+              </a:cxn>
+              <a:cxn ang="0">
+                <a:pos x="connsiteX4" y="connsiteY4"/>
+              </a:cxn>
+              <a:cxn ang="0">
+                <a:pos x="connsiteX5" y="connsiteY5"/>
+              </a:cxn>
+              <a:cxn ang="0">
+                <a:pos x="connsiteX6" y="connsiteY6"/>
+              </a:cxn>
+              <a:cxn ang="0">
+                <a:pos x="connsiteX7" y="connsiteY7"/>
+              </a:cxn>
+              <a:cxn ang="0">
+                <a:pos x="connsiteX8" y="connsiteY8"/>
+              </a:cxn>
+              <a:cxn ang="0">
+                <a:pos x="connsiteX9" y="connsiteY9"/>
+              </a:cxn>
+              <a:cxn ang="0">
+                <a:pos x="connsiteX10" y="connsiteY10"/>
+              </a:cxn>
+              <a:cxn ang="0">
+                <a:pos x="connsiteX11" y="connsiteY11"/>
+              </a:cxn>
+              <a:cxn ang="0">
+                <a:pos x="connsiteX12" y="connsiteY12"/>
+              </a:cxn>
+              <a:cxn ang="0">
+                <a:pos x="connsiteX13" y="connsiteY13"/>
+              </a:cxn>
+              <a:cxn ang="0">
+                <a:pos x="connsiteX14" y="connsiteY14"/>
+              </a:cxn>
+              <a:cxn ang="0">
+                <a:pos x="connsiteX15" y="connsiteY15"/>
+              </a:cxn>
+              <a:cxn ang="0">
+                <a:pos x="connsiteX16" y="connsiteY16"/>
+              </a:cxn>
+            </a:cxnLst>
+            <a:rect l="l" t="t" r="r" b="b"/>
+            <a:pathLst>
+              <a:path w="4480560" h="27432" fill="none" extrusionOk="0">
+                <a:moveTo>
+                  <a:pt x="0" y="0"/>
+                </a:moveTo>
+                <a:cubicBezTo>
+                  <a:pt x="267821" y="8731"/>
+                  <a:pt x="334105" y="2629"/>
+                  <a:pt x="595274" y="0"/>
+                </a:cubicBezTo>
+                <a:cubicBezTo>
+                  <a:pt x="856443" y="-2629"/>
+                  <a:pt x="863808" y="-13353"/>
+                  <a:pt x="1100938" y="0"/>
+                </a:cubicBezTo>
+                <a:cubicBezTo>
+                  <a:pt x="1338068" y="13353"/>
+                  <a:pt x="1431663" y="-25862"/>
+                  <a:pt x="1651406" y="0"/>
+                </a:cubicBezTo>
+                <a:cubicBezTo>
+                  <a:pt x="1871149" y="25862"/>
+                  <a:pt x="2173163" y="23827"/>
+                  <a:pt x="2336292" y="0"/>
+                </a:cubicBezTo>
+                <a:cubicBezTo>
+                  <a:pt x="2499421" y="-23827"/>
+                  <a:pt x="2720589" y="28148"/>
+                  <a:pt x="2931566" y="0"/>
+                </a:cubicBezTo>
+                <a:cubicBezTo>
+                  <a:pt x="3142543" y="-28148"/>
+                  <a:pt x="3323630" y="27022"/>
+                  <a:pt x="3482035" y="0"/>
+                </a:cubicBezTo>
+                <a:cubicBezTo>
+                  <a:pt x="3640440" y="-27022"/>
+                  <a:pt x="4012110" y="-20118"/>
+                  <a:pt x="4480560" y="0"/>
+                </a:cubicBezTo>
+                <a:cubicBezTo>
+                  <a:pt x="4479587" y="8304"/>
+                  <a:pt x="4480082" y="21512"/>
+                  <a:pt x="4480560" y="27432"/>
+                </a:cubicBezTo>
+                <a:cubicBezTo>
+                  <a:pt x="4314132" y="24068"/>
+                  <a:pt x="4028383" y="45776"/>
+                  <a:pt x="3840480" y="27432"/>
+                </a:cubicBezTo>
+                <a:cubicBezTo>
+                  <a:pt x="3652577" y="9088"/>
+                  <a:pt x="3547615" y="11992"/>
+                  <a:pt x="3290011" y="27432"/>
+                </a:cubicBezTo>
+                <a:cubicBezTo>
+                  <a:pt x="3032407" y="42872"/>
+                  <a:pt x="2830268" y="17863"/>
+                  <a:pt x="2560320" y="27432"/>
+                </a:cubicBezTo>
+                <a:cubicBezTo>
+                  <a:pt x="2290372" y="37001"/>
+                  <a:pt x="2147422" y="15872"/>
+                  <a:pt x="1965046" y="27432"/>
+                </a:cubicBezTo>
+                <a:cubicBezTo>
+                  <a:pt x="1782670" y="38992"/>
+                  <a:pt x="1689791" y="49824"/>
+                  <a:pt x="1459382" y="27432"/>
+                </a:cubicBezTo>
+                <a:cubicBezTo>
+                  <a:pt x="1228973" y="5040"/>
+                  <a:pt x="915486" y="45645"/>
+                  <a:pt x="774497" y="27432"/>
+                </a:cubicBezTo>
+                <a:cubicBezTo>
+                  <a:pt x="633508" y="9219"/>
+                  <a:pt x="361442" y="-1963"/>
+                  <a:pt x="0" y="27432"/>
+                </a:cubicBezTo>
+                <a:cubicBezTo>
+                  <a:pt x="-1048" y="14992"/>
+                  <a:pt x="-1120" y="7447"/>
+                  <a:pt x="0" y="0"/>
+                </a:cubicBezTo>
+                <a:close/>
+              </a:path>
+              <a:path w="4480560" h="27432" stroke="0" extrusionOk="0">
+                <a:moveTo>
+                  <a:pt x="0" y="0"/>
+                </a:moveTo>
+                <a:cubicBezTo>
+                  <a:pt x="285465" y="225"/>
+                  <a:pt x="322691" y="16223"/>
+                  <a:pt x="595274" y="0"/>
+                </a:cubicBezTo>
+                <a:cubicBezTo>
+                  <a:pt x="867857" y="-16223"/>
+                  <a:pt x="989129" y="-11242"/>
+                  <a:pt x="1100938" y="0"/>
+                </a:cubicBezTo>
+                <a:cubicBezTo>
+                  <a:pt x="1212747" y="11242"/>
+                  <a:pt x="1574350" y="-36410"/>
+                  <a:pt x="1830629" y="0"/>
+                </a:cubicBezTo>
+                <a:cubicBezTo>
+                  <a:pt x="2086908" y="36410"/>
+                  <a:pt x="2180922" y="4645"/>
+                  <a:pt x="2425903" y="0"/>
+                </a:cubicBezTo>
+                <a:cubicBezTo>
+                  <a:pt x="2670884" y="-4645"/>
+                  <a:pt x="2782024" y="22929"/>
+                  <a:pt x="3021178" y="0"/>
+                </a:cubicBezTo>
+                <a:cubicBezTo>
+                  <a:pt x="3260332" y="-22929"/>
+                  <a:pt x="3456982" y="-1586"/>
+                  <a:pt x="3750869" y="0"/>
+                </a:cubicBezTo>
+                <a:cubicBezTo>
+                  <a:pt x="4044756" y="1586"/>
+                  <a:pt x="4302726" y="17043"/>
+                  <a:pt x="4480560" y="0"/>
+                </a:cubicBezTo>
+                <a:cubicBezTo>
+                  <a:pt x="4481045" y="9333"/>
+                  <a:pt x="4481838" y="19699"/>
+                  <a:pt x="4480560" y="27432"/>
+                </a:cubicBezTo>
+                <a:cubicBezTo>
+                  <a:pt x="4279652" y="2294"/>
+                  <a:pt x="4200762" y="50710"/>
+                  <a:pt x="3930091" y="27432"/>
+                </a:cubicBezTo>
+                <a:cubicBezTo>
+                  <a:pt x="3659420" y="4154"/>
+                  <a:pt x="3456052" y="31438"/>
+                  <a:pt x="3290011" y="27432"/>
+                </a:cubicBezTo>
+                <a:cubicBezTo>
+                  <a:pt x="3123970" y="23426"/>
+                  <a:pt x="2882392" y="41962"/>
+                  <a:pt x="2649931" y="27432"/>
+                </a:cubicBezTo>
+                <a:cubicBezTo>
+                  <a:pt x="2417470" y="12902"/>
+                  <a:pt x="2238426" y="16481"/>
+                  <a:pt x="2054657" y="27432"/>
+                </a:cubicBezTo>
+                <a:cubicBezTo>
+                  <a:pt x="1870888" y="38383"/>
+                  <a:pt x="1566368" y="54184"/>
+                  <a:pt x="1324966" y="27432"/>
+                </a:cubicBezTo>
+                <a:cubicBezTo>
+                  <a:pt x="1083564" y="680"/>
+                  <a:pt x="787410" y="20090"/>
+                  <a:pt x="595274" y="27432"/>
+                </a:cubicBezTo>
+                <a:cubicBezTo>
+                  <a:pt x="403138" y="34774"/>
+                  <a:pt x="169622" y="19643"/>
+                  <a:pt x="0" y="27432"/>
+                </a:cubicBezTo>
+                <a:cubicBezTo>
+                  <a:pt x="211" y="18145"/>
+                  <a:pt x="120" y="6480"/>
+                  <a:pt x="0" y="0"/>
+                </a:cubicBezTo>
+                <a:close/>
+              </a:path>
+            </a:pathLst>
+          </a:custGeom>
+          <a:solidFill>
+            <a:schemeClr val="accent1"/>
+          </a:solidFill>
+          <a:ln w="41275" cap="rnd">
+            <a:solidFill>
+              <a:schemeClr val="accent1"/>
+            </a:solidFill>
+            <a:round/>
+            <a:extLst>
+              <a:ext uri="{C807C97D-BFC1-408E-A445-0C87EB9F89A2}">
+                <ask:lineSketchStyleProps xmlns:ask="http://schemas.microsoft.com/office/drawing/2018/sketchyshapes" sd="1219033472">
+                  <a:prstGeom prst="rect">
+                    <a:avLst/>
+                  </a:prstGeom>
+                  <ask:type>
+                    <ask:lineSketchFreehand/>
+                  </ask:type>
+                </ask:lineSketchStyleProps>
+              </a:ext>
+            </a:extLst>
+          </a:ln>
+        </p:spPr>
+        <p:style>
+          <a:lnRef idx="2">
+            <a:schemeClr val="accent1">
+              <a:shade val="50000"/>
+            </a:schemeClr>
+          </a:lnRef>
+          <a:fillRef idx="1">
+            <a:schemeClr val="accent1"/>
+          </a:fillRef>
+          <a:effectRef idx="0">
+            <a:schemeClr val="accent1"/>
+          </a:effectRef>
+          <a:fontRef idx="minor">
+            <a:schemeClr val="lt1"/>
+          </a:fontRef>
+        </p:style>
+        <p:txBody>
+          <a:bodyPr rtlCol="0" anchor="ctr"/>
+          <a:lstStyle/>
+          <a:p>
+            <a:pPr algn="ctr"/>
+            <a:endParaRPr lang="en-US"/>
           </a:p>
         </p:txBody>
       </p:sp>
@@ -7765,9 +9109,16 @@
             <p:ph idx="1"/>
           </p:nvPr>
         </p:nvSpPr>
-        <p:spPr/>
+        <p:spPr>
+          <a:xfrm>
+            <a:off x="5298595" y="552091"/>
+            <a:ext cx="6052158" cy="5431536"/>
+          </a:xfrm>
+        </p:spPr>
         <p:txBody>
-          <a:bodyPr/>
+          <a:bodyPr anchor="ctr">
+            <a:normAutofit/>
+          </a:bodyPr>
           <a:lstStyle/>
           <a:p>
             <a:r>
@@ -7805,6 +9156,14 @@
 <file path=ppt/slides/slide5.xml><?xml version="1.0" encoding="utf-8"?>
 <p:sld xmlns:a="http://schemas.openxmlformats.org/drawingml/2006/main" xmlns:r="http://schemas.openxmlformats.org/officeDocument/2006/relationships" xmlns:p="http://schemas.openxmlformats.org/presentationml/2006/main">
   <p:cSld>
+    <p:bg>
+      <p:bgPr>
+        <a:solidFill>
+          <a:schemeClr val="bg1"/>
+        </a:solidFill>
+        <a:effectLst/>
+      </p:bgPr>
+    </p:bg>
     <p:spTree>
       <p:nvGrpSpPr>
         <p:cNvPr id="1" name=""/>
@@ -7819,6 +9178,66 @@
           <a:chExt cx="0" cy="0"/>
         </a:xfrm>
       </p:grpSpPr>
+      <p:sp useBgFill="1">
+        <p:nvSpPr>
+          <p:cNvPr id="8" name="Rectangle 7">
+            <a:extLst>
+              <a:ext uri="{FF2B5EF4-FFF2-40B4-BE49-F238E27FC236}">
+                <a16:creationId xmlns:a16="http://schemas.microsoft.com/office/drawing/2014/main" id="{777A147A-9ED8-46B4-8660-1B3C2AA880B5}"/>
+              </a:ext>
+              <a:ext uri="{C183D7F6-B498-43B3-948B-1728B52AA6E4}">
+                <adec:decorative xmlns:adec="http://schemas.microsoft.com/office/drawing/2017/decorative" val="1"/>
+              </a:ext>
+            </a:extLst>
+          </p:cNvPr>
+          <p:cNvSpPr>
+            <a:spLocks noGrp="1" noRot="1" noChangeAspect="1" noMove="1" noResize="1" noEditPoints="1" noAdjustHandles="1" noChangeArrowheads="1" noChangeShapeType="1" noTextEdit="1"/>
+          </p:cNvSpPr>
+          <p:nvPr>
+            <p:extLst>
+              <p:ext uri="{386F3935-93C4-4BCD-93E2-E3B085C9AB24}">
+                <p16:designElem xmlns:p16="http://schemas.microsoft.com/office/powerpoint/2015/main" val="1"/>
+              </p:ext>
+            </p:extLst>
+          </p:nvPr>
+        </p:nvSpPr>
+        <p:spPr>
+          <a:xfrm>
+            <a:off x="0" y="0"/>
+            <a:ext cx="12188952" cy="6858000"/>
+          </a:xfrm>
+          <a:prstGeom prst="rect">
+            <a:avLst/>
+          </a:prstGeom>
+          <a:ln>
+            <a:noFill/>
+          </a:ln>
+        </p:spPr>
+        <p:style>
+          <a:lnRef idx="2">
+            <a:schemeClr val="accent1">
+              <a:shade val="50000"/>
+            </a:schemeClr>
+          </a:lnRef>
+          <a:fillRef idx="1">
+            <a:schemeClr val="accent1"/>
+          </a:fillRef>
+          <a:effectRef idx="0">
+            <a:schemeClr val="accent1"/>
+          </a:effectRef>
+          <a:fontRef idx="minor">
+            <a:schemeClr val="lt1"/>
+          </a:fontRef>
+        </p:style>
+        <p:txBody>
+          <a:bodyPr rtlCol="0" anchor="ctr"/>
+          <a:lstStyle/>
+          <a:p>
+            <a:pPr algn="ctr"/>
+            <a:endParaRPr lang="en-US"/>
+          </a:p>
+        </p:txBody>
+      </p:sp>
       <p:sp>
         <p:nvSpPr>
           <p:cNvPr id="2" name="Titel 1">
@@ -7835,23 +9254,365 @@
             <p:ph type="title"/>
           </p:nvPr>
         </p:nvSpPr>
-        <p:spPr/>
+        <p:spPr>
+          <a:xfrm>
+            <a:off x="841248" y="548640"/>
+            <a:ext cx="3419540" cy="5431536"/>
+          </a:xfrm>
+        </p:spPr>
         <p:txBody>
-          <a:bodyPr/>
+          <a:bodyPr>
+            <a:normAutofit/>
+          </a:bodyPr>
           <a:lstStyle/>
           <a:p>
             <a:r>
-              <a:rPr lang="de-DE" dirty="0"/>
-              <a:t>Was für </a:t>
+              <a:rPr lang="de-DE" sz="6000"/>
+              <a:t>Was für Addons / Technologien gibt es bereit?</a:t>
             </a:r>
-            <a:r>
-              <a:rPr lang="de-DE" dirty="0" err="1"/>
-              <a:t>Addons</a:t>
-            </a:r>
-            <a:r>
-              <a:rPr lang="de-DE" dirty="0"/>
-              <a:t> / Technologien gibt es bereit?</a:t>
-            </a:r>
+          </a:p>
+        </p:txBody>
+      </p:sp>
+      <p:sp>
+        <p:nvSpPr>
+          <p:cNvPr id="10" name="Rectangle 6">
+            <a:extLst>
+              <a:ext uri="{FF2B5EF4-FFF2-40B4-BE49-F238E27FC236}">
+                <a16:creationId xmlns:a16="http://schemas.microsoft.com/office/drawing/2014/main" id="{5D6C15A0-C087-4593-8414-2B4EC1CDC3DE}"/>
+              </a:ext>
+              <a:ext uri="{C183D7F6-B498-43B3-948B-1728B52AA6E4}">
+                <adec:decorative xmlns:adec="http://schemas.microsoft.com/office/drawing/2017/decorative" val="1"/>
+              </a:ext>
+            </a:extLst>
+          </p:cNvPr>
+          <p:cNvSpPr>
+            <a:spLocks noGrp="1" noRot="1" noChangeAspect="1" noMove="1" noResize="1" noEditPoints="1" noAdjustHandles="1" noChangeArrowheads="1" noChangeShapeType="1" noTextEdit="1"/>
+          </p:cNvSpPr>
+          <p:nvPr>
+            <p:extLst>
+              <p:ext uri="{386F3935-93C4-4BCD-93E2-E3B085C9AB24}">
+                <p16:designElem xmlns:p16="http://schemas.microsoft.com/office/powerpoint/2015/main" val="1"/>
+              </p:ext>
+            </p:extLst>
+          </p:nvPr>
+        </p:nvSpPr>
+        <p:spPr>
+          <a:xfrm rot="5400000">
+            <a:off x="2539411" y="3254143"/>
+            <a:ext cx="4480560" cy="27432"/>
+          </a:xfrm>
+          <a:custGeom>
+            <a:avLst/>
+            <a:gdLst>
+              <a:gd name="connsiteX0" fmla="*/ 0 w 4480560"/>
+              <a:gd name="connsiteY0" fmla="*/ 0 h 27432"/>
+              <a:gd name="connsiteX1" fmla="*/ 595274 w 4480560"/>
+              <a:gd name="connsiteY1" fmla="*/ 0 h 27432"/>
+              <a:gd name="connsiteX2" fmla="*/ 1100938 w 4480560"/>
+              <a:gd name="connsiteY2" fmla="*/ 0 h 27432"/>
+              <a:gd name="connsiteX3" fmla="*/ 1651406 w 4480560"/>
+              <a:gd name="connsiteY3" fmla="*/ 0 h 27432"/>
+              <a:gd name="connsiteX4" fmla="*/ 2336292 w 4480560"/>
+              <a:gd name="connsiteY4" fmla="*/ 0 h 27432"/>
+              <a:gd name="connsiteX5" fmla="*/ 2931566 w 4480560"/>
+              <a:gd name="connsiteY5" fmla="*/ 0 h 27432"/>
+              <a:gd name="connsiteX6" fmla="*/ 3482035 w 4480560"/>
+              <a:gd name="connsiteY6" fmla="*/ 0 h 27432"/>
+              <a:gd name="connsiteX7" fmla="*/ 4480560 w 4480560"/>
+              <a:gd name="connsiteY7" fmla="*/ 0 h 27432"/>
+              <a:gd name="connsiteX8" fmla="*/ 4480560 w 4480560"/>
+              <a:gd name="connsiteY8" fmla="*/ 27432 h 27432"/>
+              <a:gd name="connsiteX9" fmla="*/ 3840480 w 4480560"/>
+              <a:gd name="connsiteY9" fmla="*/ 27432 h 27432"/>
+              <a:gd name="connsiteX10" fmla="*/ 3290011 w 4480560"/>
+              <a:gd name="connsiteY10" fmla="*/ 27432 h 27432"/>
+              <a:gd name="connsiteX11" fmla="*/ 2560320 w 4480560"/>
+              <a:gd name="connsiteY11" fmla="*/ 27432 h 27432"/>
+              <a:gd name="connsiteX12" fmla="*/ 1965046 w 4480560"/>
+              <a:gd name="connsiteY12" fmla="*/ 27432 h 27432"/>
+              <a:gd name="connsiteX13" fmla="*/ 1459382 w 4480560"/>
+              <a:gd name="connsiteY13" fmla="*/ 27432 h 27432"/>
+              <a:gd name="connsiteX14" fmla="*/ 774497 w 4480560"/>
+              <a:gd name="connsiteY14" fmla="*/ 27432 h 27432"/>
+              <a:gd name="connsiteX15" fmla="*/ 0 w 4480560"/>
+              <a:gd name="connsiteY15" fmla="*/ 27432 h 27432"/>
+              <a:gd name="connsiteX16" fmla="*/ 0 w 4480560"/>
+              <a:gd name="connsiteY16" fmla="*/ 0 h 27432"/>
+            </a:gdLst>
+            <a:ahLst/>
+            <a:cxnLst>
+              <a:cxn ang="0">
+                <a:pos x="connsiteX0" y="connsiteY0"/>
+              </a:cxn>
+              <a:cxn ang="0">
+                <a:pos x="connsiteX1" y="connsiteY1"/>
+              </a:cxn>
+              <a:cxn ang="0">
+                <a:pos x="connsiteX2" y="connsiteY2"/>
+              </a:cxn>
+              <a:cxn ang="0">
+                <a:pos x="connsiteX3" y="connsiteY3"/>
+              </a:cxn>
+              <a:cxn ang="0">
+                <a:pos x="connsiteX4" y="connsiteY4"/>
+              </a:cxn>
+              <a:cxn ang="0">
+                <a:pos x="connsiteX5" y="connsiteY5"/>
+              </a:cxn>
+              <a:cxn ang="0">
+                <a:pos x="connsiteX6" y="connsiteY6"/>
+              </a:cxn>
+              <a:cxn ang="0">
+                <a:pos x="connsiteX7" y="connsiteY7"/>
+              </a:cxn>
+              <a:cxn ang="0">
+                <a:pos x="connsiteX8" y="connsiteY8"/>
+              </a:cxn>
+              <a:cxn ang="0">
+                <a:pos x="connsiteX9" y="connsiteY9"/>
+              </a:cxn>
+              <a:cxn ang="0">
+                <a:pos x="connsiteX10" y="connsiteY10"/>
+              </a:cxn>
+              <a:cxn ang="0">
+                <a:pos x="connsiteX11" y="connsiteY11"/>
+              </a:cxn>
+              <a:cxn ang="0">
+                <a:pos x="connsiteX12" y="connsiteY12"/>
+              </a:cxn>
+              <a:cxn ang="0">
+                <a:pos x="connsiteX13" y="connsiteY13"/>
+              </a:cxn>
+              <a:cxn ang="0">
+                <a:pos x="connsiteX14" y="connsiteY14"/>
+              </a:cxn>
+              <a:cxn ang="0">
+                <a:pos x="connsiteX15" y="connsiteY15"/>
+              </a:cxn>
+              <a:cxn ang="0">
+                <a:pos x="connsiteX16" y="connsiteY16"/>
+              </a:cxn>
+            </a:cxnLst>
+            <a:rect l="l" t="t" r="r" b="b"/>
+            <a:pathLst>
+              <a:path w="4480560" h="27432" fill="none" extrusionOk="0">
+                <a:moveTo>
+                  <a:pt x="0" y="0"/>
+                </a:moveTo>
+                <a:cubicBezTo>
+                  <a:pt x="267821" y="8731"/>
+                  <a:pt x="334105" y="2629"/>
+                  <a:pt x="595274" y="0"/>
+                </a:cubicBezTo>
+                <a:cubicBezTo>
+                  <a:pt x="856443" y="-2629"/>
+                  <a:pt x="863808" y="-13353"/>
+                  <a:pt x="1100938" y="0"/>
+                </a:cubicBezTo>
+                <a:cubicBezTo>
+                  <a:pt x="1338068" y="13353"/>
+                  <a:pt x="1431663" y="-25862"/>
+                  <a:pt x="1651406" y="0"/>
+                </a:cubicBezTo>
+                <a:cubicBezTo>
+                  <a:pt x="1871149" y="25862"/>
+                  <a:pt x="2173163" y="23827"/>
+                  <a:pt x="2336292" y="0"/>
+                </a:cubicBezTo>
+                <a:cubicBezTo>
+                  <a:pt x="2499421" y="-23827"/>
+                  <a:pt x="2720589" y="28148"/>
+                  <a:pt x="2931566" y="0"/>
+                </a:cubicBezTo>
+                <a:cubicBezTo>
+                  <a:pt x="3142543" y="-28148"/>
+                  <a:pt x="3323630" y="27022"/>
+                  <a:pt x="3482035" y="0"/>
+                </a:cubicBezTo>
+                <a:cubicBezTo>
+                  <a:pt x="3640440" y="-27022"/>
+                  <a:pt x="4012110" y="-20118"/>
+                  <a:pt x="4480560" y="0"/>
+                </a:cubicBezTo>
+                <a:cubicBezTo>
+                  <a:pt x="4479587" y="8304"/>
+                  <a:pt x="4480082" y="21512"/>
+                  <a:pt x="4480560" y="27432"/>
+                </a:cubicBezTo>
+                <a:cubicBezTo>
+                  <a:pt x="4314132" y="24068"/>
+                  <a:pt x="4028383" y="45776"/>
+                  <a:pt x="3840480" y="27432"/>
+                </a:cubicBezTo>
+                <a:cubicBezTo>
+                  <a:pt x="3652577" y="9088"/>
+                  <a:pt x="3547615" y="11992"/>
+                  <a:pt x="3290011" y="27432"/>
+                </a:cubicBezTo>
+                <a:cubicBezTo>
+                  <a:pt x="3032407" y="42872"/>
+                  <a:pt x="2830268" y="17863"/>
+                  <a:pt x="2560320" y="27432"/>
+                </a:cubicBezTo>
+                <a:cubicBezTo>
+                  <a:pt x="2290372" y="37001"/>
+                  <a:pt x="2147422" y="15872"/>
+                  <a:pt x="1965046" y="27432"/>
+                </a:cubicBezTo>
+                <a:cubicBezTo>
+                  <a:pt x="1782670" y="38992"/>
+                  <a:pt x="1689791" y="49824"/>
+                  <a:pt x="1459382" y="27432"/>
+                </a:cubicBezTo>
+                <a:cubicBezTo>
+                  <a:pt x="1228973" y="5040"/>
+                  <a:pt x="915486" y="45645"/>
+                  <a:pt x="774497" y="27432"/>
+                </a:cubicBezTo>
+                <a:cubicBezTo>
+                  <a:pt x="633508" y="9219"/>
+                  <a:pt x="361442" y="-1963"/>
+                  <a:pt x="0" y="27432"/>
+                </a:cubicBezTo>
+                <a:cubicBezTo>
+                  <a:pt x="-1048" y="14992"/>
+                  <a:pt x="-1120" y="7447"/>
+                  <a:pt x="0" y="0"/>
+                </a:cubicBezTo>
+                <a:close/>
+              </a:path>
+              <a:path w="4480560" h="27432" stroke="0" extrusionOk="0">
+                <a:moveTo>
+                  <a:pt x="0" y="0"/>
+                </a:moveTo>
+                <a:cubicBezTo>
+                  <a:pt x="285465" y="225"/>
+                  <a:pt x="322691" y="16223"/>
+                  <a:pt x="595274" y="0"/>
+                </a:cubicBezTo>
+                <a:cubicBezTo>
+                  <a:pt x="867857" y="-16223"/>
+                  <a:pt x="989129" y="-11242"/>
+                  <a:pt x="1100938" y="0"/>
+                </a:cubicBezTo>
+                <a:cubicBezTo>
+                  <a:pt x="1212747" y="11242"/>
+                  <a:pt x="1574350" y="-36410"/>
+                  <a:pt x="1830629" y="0"/>
+                </a:cubicBezTo>
+                <a:cubicBezTo>
+                  <a:pt x="2086908" y="36410"/>
+                  <a:pt x="2180922" y="4645"/>
+                  <a:pt x="2425903" y="0"/>
+                </a:cubicBezTo>
+                <a:cubicBezTo>
+                  <a:pt x="2670884" y="-4645"/>
+                  <a:pt x="2782024" y="22929"/>
+                  <a:pt x="3021178" y="0"/>
+                </a:cubicBezTo>
+                <a:cubicBezTo>
+                  <a:pt x="3260332" y="-22929"/>
+                  <a:pt x="3456982" y="-1586"/>
+                  <a:pt x="3750869" y="0"/>
+                </a:cubicBezTo>
+                <a:cubicBezTo>
+                  <a:pt x="4044756" y="1586"/>
+                  <a:pt x="4302726" y="17043"/>
+                  <a:pt x="4480560" y="0"/>
+                </a:cubicBezTo>
+                <a:cubicBezTo>
+                  <a:pt x="4481045" y="9333"/>
+                  <a:pt x="4481838" y="19699"/>
+                  <a:pt x="4480560" y="27432"/>
+                </a:cubicBezTo>
+                <a:cubicBezTo>
+                  <a:pt x="4279652" y="2294"/>
+                  <a:pt x="4200762" y="50710"/>
+                  <a:pt x="3930091" y="27432"/>
+                </a:cubicBezTo>
+                <a:cubicBezTo>
+                  <a:pt x="3659420" y="4154"/>
+                  <a:pt x="3456052" y="31438"/>
+                  <a:pt x="3290011" y="27432"/>
+                </a:cubicBezTo>
+                <a:cubicBezTo>
+                  <a:pt x="3123970" y="23426"/>
+                  <a:pt x="2882392" y="41962"/>
+                  <a:pt x="2649931" y="27432"/>
+                </a:cubicBezTo>
+                <a:cubicBezTo>
+                  <a:pt x="2417470" y="12902"/>
+                  <a:pt x="2238426" y="16481"/>
+                  <a:pt x="2054657" y="27432"/>
+                </a:cubicBezTo>
+                <a:cubicBezTo>
+                  <a:pt x="1870888" y="38383"/>
+                  <a:pt x="1566368" y="54184"/>
+                  <a:pt x="1324966" y="27432"/>
+                </a:cubicBezTo>
+                <a:cubicBezTo>
+                  <a:pt x="1083564" y="680"/>
+                  <a:pt x="787410" y="20090"/>
+                  <a:pt x="595274" y="27432"/>
+                </a:cubicBezTo>
+                <a:cubicBezTo>
+                  <a:pt x="403138" y="34774"/>
+                  <a:pt x="169622" y="19643"/>
+                  <a:pt x="0" y="27432"/>
+                </a:cubicBezTo>
+                <a:cubicBezTo>
+                  <a:pt x="211" y="18145"/>
+                  <a:pt x="120" y="6480"/>
+                  <a:pt x="0" y="0"/>
+                </a:cubicBezTo>
+                <a:close/>
+              </a:path>
+            </a:pathLst>
+          </a:custGeom>
+          <a:solidFill>
+            <a:schemeClr val="accent1"/>
+          </a:solidFill>
+          <a:ln w="41275" cap="rnd">
+            <a:solidFill>
+              <a:schemeClr val="accent1"/>
+            </a:solidFill>
+            <a:round/>
+            <a:extLst>
+              <a:ext uri="{C807C97D-BFC1-408E-A445-0C87EB9F89A2}">
+                <ask:lineSketchStyleProps xmlns:ask="http://schemas.microsoft.com/office/drawing/2018/sketchyshapes" sd="1219033472">
+                  <a:prstGeom prst="rect">
+                    <a:avLst/>
+                  </a:prstGeom>
+                  <ask:type>
+                    <ask:lineSketchFreehand/>
+                  </ask:type>
+                </ask:lineSketchStyleProps>
+              </a:ext>
+            </a:extLst>
+          </a:ln>
+        </p:spPr>
+        <p:style>
+          <a:lnRef idx="2">
+            <a:schemeClr val="accent1">
+              <a:shade val="50000"/>
+            </a:schemeClr>
+          </a:lnRef>
+          <a:fillRef idx="1">
+            <a:schemeClr val="accent1"/>
+          </a:fillRef>
+          <a:effectRef idx="0">
+            <a:schemeClr val="accent1"/>
+          </a:effectRef>
+          <a:fontRef idx="minor">
+            <a:schemeClr val="lt1"/>
+          </a:fontRef>
+        </p:style>
+        <p:txBody>
+          <a:bodyPr rtlCol="0" anchor="ctr"/>
+          <a:lstStyle/>
+          <a:p>
+            <a:pPr algn="ctr"/>
+            <a:endParaRPr lang="en-US"/>
           </a:p>
         </p:txBody>
       </p:sp>
@@ -7871,9 +9632,16 @@
             <p:ph idx="1"/>
           </p:nvPr>
         </p:nvSpPr>
-        <p:spPr/>
+        <p:spPr>
+          <a:xfrm>
+            <a:off x="5298595" y="552091"/>
+            <a:ext cx="6052158" cy="5431536"/>
+          </a:xfrm>
+        </p:spPr>
         <p:txBody>
-          <a:bodyPr/>
+          <a:bodyPr anchor="ctr">
+            <a:normAutofit/>
+          </a:bodyPr>
           <a:lstStyle/>
           <a:p>
             <a:r>
@@ -7901,12 +9669,112 @@
   <p:clrMapOvr>
     <a:masterClrMapping/>
   </p:clrMapOvr>
+  <p:timing>
+    <p:tnLst>
+      <p:par>
+        <p:cTn id="1" dur="indefinite" restart="never" nodeType="tmRoot">
+          <p:childTnLst>
+            <p:seq concurrent="1" nextAc="seek">
+              <p:cTn id="2" dur="indefinite" nodeType="mainSeq">
+                <p:childTnLst>
+                  <p:par>
+                    <p:cTn id="3" fill="hold">
+                      <p:stCondLst>
+                        <p:cond delay="indefinite"/>
+                        <p:cond evt="onBegin" delay="0">
+                          <p:tn val="2"/>
+                        </p:cond>
+                      </p:stCondLst>
+                      <p:childTnLst>
+                        <p:par>
+                          <p:cTn id="4" fill="hold">
+                            <p:stCondLst>
+                              <p:cond delay="0"/>
+                            </p:stCondLst>
+                            <p:childTnLst>
+                              <p:par>
+                                <p:cTn id="5" presetID="10" presetClass="entr" presetSubtype="0" fill="hold" grpId="0" nodeType="withEffect">
+                                  <p:stCondLst>
+                                    <p:cond delay="500"/>
+                                  </p:stCondLst>
+                                  <p:iterate type="lt">
+                                    <p:tmPct val="10000"/>
+                                  </p:iterate>
+                                  <p:childTnLst>
+                                    <p:set>
+                                      <p:cBhvr>
+                                        <p:cTn id="6" dur="1" fill="hold">
+                                          <p:stCondLst>
+                                            <p:cond delay="0"/>
+                                          </p:stCondLst>
+                                        </p:cTn>
+                                        <p:tgtEl>
+                                          <p:spTgt spid="2"/>
+                                        </p:tgtEl>
+                                        <p:attrNameLst>
+                                          <p:attrName>style.visibility</p:attrName>
+                                        </p:attrNameLst>
+                                      </p:cBhvr>
+                                      <p:to>
+                                        <p:strVal val="visible"/>
+                                      </p:to>
+                                    </p:set>
+                                    <p:animEffect transition="in" filter="fade">
+                                      <p:cBhvr>
+                                        <p:cTn id="7" dur="400"/>
+                                        <p:tgtEl>
+                                          <p:spTgt spid="2"/>
+                                        </p:tgtEl>
+                                      </p:cBhvr>
+                                    </p:animEffect>
+                                  </p:childTnLst>
+                                </p:cTn>
+                              </p:par>
+                            </p:childTnLst>
+                          </p:cTn>
+                        </p:par>
+                      </p:childTnLst>
+                    </p:cTn>
+                  </p:par>
+                </p:childTnLst>
+              </p:cTn>
+              <p:prevCondLst>
+                <p:cond evt="onPrev" delay="0">
+                  <p:tgtEl>
+                    <p:sldTgt/>
+                  </p:tgtEl>
+                </p:cond>
+              </p:prevCondLst>
+              <p:nextCondLst>
+                <p:cond evt="onNext" delay="0">
+                  <p:tgtEl>
+                    <p:sldTgt/>
+                  </p:tgtEl>
+                </p:cond>
+              </p:nextCondLst>
+            </p:seq>
+          </p:childTnLst>
+        </p:cTn>
+      </p:par>
+    </p:tnLst>
+    <p:bldLst>
+      <p:bldP spid="2" grpId="0"/>
+    </p:bldLst>
+  </p:timing>
 </p:sld>
 </file>
 
 <file path=ppt/slides/slide6.xml><?xml version="1.0" encoding="utf-8"?>
 <p:sld xmlns:a="http://schemas.openxmlformats.org/drawingml/2006/main" xmlns:r="http://schemas.openxmlformats.org/officeDocument/2006/relationships" xmlns:p="http://schemas.openxmlformats.org/presentationml/2006/main">
   <p:cSld>
+    <p:bg>
+      <p:bgPr>
+        <a:solidFill>
+          <a:schemeClr val="bg1"/>
+        </a:solidFill>
+        <a:effectLst/>
+      </p:bgPr>
+    </p:bg>
     <p:spTree>
       <p:nvGrpSpPr>
         <p:cNvPr id="1" name=""/>
@@ -7921,6 +9789,66 @@
           <a:chExt cx="0" cy="0"/>
         </a:xfrm>
       </p:grpSpPr>
+      <p:sp useBgFill="1">
+        <p:nvSpPr>
+          <p:cNvPr id="8" name="Rectangle 7">
+            <a:extLst>
+              <a:ext uri="{FF2B5EF4-FFF2-40B4-BE49-F238E27FC236}">
+                <a16:creationId xmlns:a16="http://schemas.microsoft.com/office/drawing/2014/main" id="{777A147A-9ED8-46B4-8660-1B3C2AA880B5}"/>
+              </a:ext>
+              <a:ext uri="{C183D7F6-B498-43B3-948B-1728B52AA6E4}">
+                <adec:decorative xmlns:adec="http://schemas.microsoft.com/office/drawing/2017/decorative" val="1"/>
+              </a:ext>
+            </a:extLst>
+          </p:cNvPr>
+          <p:cNvSpPr>
+            <a:spLocks noGrp="1" noRot="1" noChangeAspect="1" noMove="1" noResize="1" noEditPoints="1" noAdjustHandles="1" noChangeArrowheads="1" noChangeShapeType="1" noTextEdit="1"/>
+          </p:cNvSpPr>
+          <p:nvPr>
+            <p:extLst>
+              <p:ext uri="{386F3935-93C4-4BCD-93E2-E3B085C9AB24}">
+                <p16:designElem xmlns:p16="http://schemas.microsoft.com/office/powerpoint/2015/main" val="1"/>
+              </p:ext>
+            </p:extLst>
+          </p:nvPr>
+        </p:nvSpPr>
+        <p:spPr>
+          <a:xfrm>
+            <a:off x="0" y="0"/>
+            <a:ext cx="12188952" cy="6858000"/>
+          </a:xfrm>
+          <a:prstGeom prst="rect">
+            <a:avLst/>
+          </a:prstGeom>
+          <a:ln>
+            <a:noFill/>
+          </a:ln>
+        </p:spPr>
+        <p:style>
+          <a:lnRef idx="2">
+            <a:schemeClr val="accent1">
+              <a:shade val="50000"/>
+            </a:schemeClr>
+          </a:lnRef>
+          <a:fillRef idx="1">
+            <a:schemeClr val="accent1"/>
+          </a:fillRef>
+          <a:effectRef idx="0">
+            <a:schemeClr val="accent1"/>
+          </a:effectRef>
+          <a:fontRef idx="minor">
+            <a:schemeClr val="lt1"/>
+          </a:fontRef>
+        </p:style>
+        <p:txBody>
+          <a:bodyPr rtlCol="0" anchor="ctr"/>
+          <a:lstStyle/>
+          <a:p>
+            <a:pPr algn="ctr"/>
+            <a:endParaRPr lang="en-US"/>
+          </a:p>
+        </p:txBody>
+      </p:sp>
       <p:sp>
         <p:nvSpPr>
           <p:cNvPr id="2" name="Titel 1">
@@ -7937,15 +9865,365 @@
             <p:ph type="title"/>
           </p:nvPr>
         </p:nvSpPr>
-        <p:spPr/>
+        <p:spPr>
+          <a:xfrm>
+            <a:off x="841248" y="548640"/>
+            <a:ext cx="3419540" cy="5431536"/>
+          </a:xfrm>
+        </p:spPr>
         <p:txBody>
-          <a:bodyPr/>
+          <a:bodyPr>
+            <a:normAutofit/>
+          </a:bodyPr>
           <a:lstStyle/>
           <a:p>
             <a:r>
-              <a:rPr lang="de-DE" dirty="0"/>
+              <a:rPr lang="de-DE" sz="5600"/>
               <a:t>Schwierigkeiten bei der Entwicklung</a:t>
             </a:r>
+          </a:p>
+        </p:txBody>
+      </p:sp>
+      <p:sp>
+        <p:nvSpPr>
+          <p:cNvPr id="10" name="Rectangle 6">
+            <a:extLst>
+              <a:ext uri="{FF2B5EF4-FFF2-40B4-BE49-F238E27FC236}">
+                <a16:creationId xmlns:a16="http://schemas.microsoft.com/office/drawing/2014/main" id="{5D6C15A0-C087-4593-8414-2B4EC1CDC3DE}"/>
+              </a:ext>
+              <a:ext uri="{C183D7F6-B498-43B3-948B-1728B52AA6E4}">
+                <adec:decorative xmlns:adec="http://schemas.microsoft.com/office/drawing/2017/decorative" val="1"/>
+              </a:ext>
+            </a:extLst>
+          </p:cNvPr>
+          <p:cNvSpPr>
+            <a:spLocks noGrp="1" noRot="1" noChangeAspect="1" noMove="1" noResize="1" noEditPoints="1" noAdjustHandles="1" noChangeArrowheads="1" noChangeShapeType="1" noTextEdit="1"/>
+          </p:cNvSpPr>
+          <p:nvPr>
+            <p:extLst>
+              <p:ext uri="{386F3935-93C4-4BCD-93E2-E3B085C9AB24}">
+                <p16:designElem xmlns:p16="http://schemas.microsoft.com/office/powerpoint/2015/main" val="1"/>
+              </p:ext>
+            </p:extLst>
+          </p:nvPr>
+        </p:nvSpPr>
+        <p:spPr>
+          <a:xfrm rot="5400000">
+            <a:off x="2539411" y="3254143"/>
+            <a:ext cx="4480560" cy="27432"/>
+          </a:xfrm>
+          <a:custGeom>
+            <a:avLst/>
+            <a:gdLst>
+              <a:gd name="connsiteX0" fmla="*/ 0 w 4480560"/>
+              <a:gd name="connsiteY0" fmla="*/ 0 h 27432"/>
+              <a:gd name="connsiteX1" fmla="*/ 595274 w 4480560"/>
+              <a:gd name="connsiteY1" fmla="*/ 0 h 27432"/>
+              <a:gd name="connsiteX2" fmla="*/ 1100938 w 4480560"/>
+              <a:gd name="connsiteY2" fmla="*/ 0 h 27432"/>
+              <a:gd name="connsiteX3" fmla="*/ 1651406 w 4480560"/>
+              <a:gd name="connsiteY3" fmla="*/ 0 h 27432"/>
+              <a:gd name="connsiteX4" fmla="*/ 2336292 w 4480560"/>
+              <a:gd name="connsiteY4" fmla="*/ 0 h 27432"/>
+              <a:gd name="connsiteX5" fmla="*/ 2931566 w 4480560"/>
+              <a:gd name="connsiteY5" fmla="*/ 0 h 27432"/>
+              <a:gd name="connsiteX6" fmla="*/ 3482035 w 4480560"/>
+              <a:gd name="connsiteY6" fmla="*/ 0 h 27432"/>
+              <a:gd name="connsiteX7" fmla="*/ 4480560 w 4480560"/>
+              <a:gd name="connsiteY7" fmla="*/ 0 h 27432"/>
+              <a:gd name="connsiteX8" fmla="*/ 4480560 w 4480560"/>
+              <a:gd name="connsiteY8" fmla="*/ 27432 h 27432"/>
+              <a:gd name="connsiteX9" fmla="*/ 3840480 w 4480560"/>
+              <a:gd name="connsiteY9" fmla="*/ 27432 h 27432"/>
+              <a:gd name="connsiteX10" fmla="*/ 3290011 w 4480560"/>
+              <a:gd name="connsiteY10" fmla="*/ 27432 h 27432"/>
+              <a:gd name="connsiteX11" fmla="*/ 2560320 w 4480560"/>
+              <a:gd name="connsiteY11" fmla="*/ 27432 h 27432"/>
+              <a:gd name="connsiteX12" fmla="*/ 1965046 w 4480560"/>
+              <a:gd name="connsiteY12" fmla="*/ 27432 h 27432"/>
+              <a:gd name="connsiteX13" fmla="*/ 1459382 w 4480560"/>
+              <a:gd name="connsiteY13" fmla="*/ 27432 h 27432"/>
+              <a:gd name="connsiteX14" fmla="*/ 774497 w 4480560"/>
+              <a:gd name="connsiteY14" fmla="*/ 27432 h 27432"/>
+              <a:gd name="connsiteX15" fmla="*/ 0 w 4480560"/>
+              <a:gd name="connsiteY15" fmla="*/ 27432 h 27432"/>
+              <a:gd name="connsiteX16" fmla="*/ 0 w 4480560"/>
+              <a:gd name="connsiteY16" fmla="*/ 0 h 27432"/>
+            </a:gdLst>
+            <a:ahLst/>
+            <a:cxnLst>
+              <a:cxn ang="0">
+                <a:pos x="connsiteX0" y="connsiteY0"/>
+              </a:cxn>
+              <a:cxn ang="0">
+                <a:pos x="connsiteX1" y="connsiteY1"/>
+              </a:cxn>
+              <a:cxn ang="0">
+                <a:pos x="connsiteX2" y="connsiteY2"/>
+              </a:cxn>
+              <a:cxn ang="0">
+                <a:pos x="connsiteX3" y="connsiteY3"/>
+              </a:cxn>
+              <a:cxn ang="0">
+                <a:pos x="connsiteX4" y="connsiteY4"/>
+              </a:cxn>
+              <a:cxn ang="0">
+                <a:pos x="connsiteX5" y="connsiteY5"/>
+              </a:cxn>
+              <a:cxn ang="0">
+                <a:pos x="connsiteX6" y="connsiteY6"/>
+              </a:cxn>
+              <a:cxn ang="0">
+                <a:pos x="connsiteX7" y="connsiteY7"/>
+              </a:cxn>
+              <a:cxn ang="0">
+                <a:pos x="connsiteX8" y="connsiteY8"/>
+              </a:cxn>
+              <a:cxn ang="0">
+                <a:pos x="connsiteX9" y="connsiteY9"/>
+              </a:cxn>
+              <a:cxn ang="0">
+                <a:pos x="connsiteX10" y="connsiteY10"/>
+              </a:cxn>
+              <a:cxn ang="0">
+                <a:pos x="connsiteX11" y="connsiteY11"/>
+              </a:cxn>
+              <a:cxn ang="0">
+                <a:pos x="connsiteX12" y="connsiteY12"/>
+              </a:cxn>
+              <a:cxn ang="0">
+                <a:pos x="connsiteX13" y="connsiteY13"/>
+              </a:cxn>
+              <a:cxn ang="0">
+                <a:pos x="connsiteX14" y="connsiteY14"/>
+              </a:cxn>
+              <a:cxn ang="0">
+                <a:pos x="connsiteX15" y="connsiteY15"/>
+              </a:cxn>
+              <a:cxn ang="0">
+                <a:pos x="connsiteX16" y="connsiteY16"/>
+              </a:cxn>
+            </a:cxnLst>
+            <a:rect l="l" t="t" r="r" b="b"/>
+            <a:pathLst>
+              <a:path w="4480560" h="27432" fill="none" extrusionOk="0">
+                <a:moveTo>
+                  <a:pt x="0" y="0"/>
+                </a:moveTo>
+                <a:cubicBezTo>
+                  <a:pt x="267821" y="8731"/>
+                  <a:pt x="334105" y="2629"/>
+                  <a:pt x="595274" y="0"/>
+                </a:cubicBezTo>
+                <a:cubicBezTo>
+                  <a:pt x="856443" y="-2629"/>
+                  <a:pt x="863808" y="-13353"/>
+                  <a:pt x="1100938" y="0"/>
+                </a:cubicBezTo>
+                <a:cubicBezTo>
+                  <a:pt x="1338068" y="13353"/>
+                  <a:pt x="1431663" y="-25862"/>
+                  <a:pt x="1651406" y="0"/>
+                </a:cubicBezTo>
+                <a:cubicBezTo>
+                  <a:pt x="1871149" y="25862"/>
+                  <a:pt x="2173163" y="23827"/>
+                  <a:pt x="2336292" y="0"/>
+                </a:cubicBezTo>
+                <a:cubicBezTo>
+                  <a:pt x="2499421" y="-23827"/>
+                  <a:pt x="2720589" y="28148"/>
+                  <a:pt x="2931566" y="0"/>
+                </a:cubicBezTo>
+                <a:cubicBezTo>
+                  <a:pt x="3142543" y="-28148"/>
+                  <a:pt x="3323630" y="27022"/>
+                  <a:pt x="3482035" y="0"/>
+                </a:cubicBezTo>
+                <a:cubicBezTo>
+                  <a:pt x="3640440" y="-27022"/>
+                  <a:pt x="4012110" y="-20118"/>
+                  <a:pt x="4480560" y="0"/>
+                </a:cubicBezTo>
+                <a:cubicBezTo>
+                  <a:pt x="4479587" y="8304"/>
+                  <a:pt x="4480082" y="21512"/>
+                  <a:pt x="4480560" y="27432"/>
+                </a:cubicBezTo>
+                <a:cubicBezTo>
+                  <a:pt x="4314132" y="24068"/>
+                  <a:pt x="4028383" y="45776"/>
+                  <a:pt x="3840480" y="27432"/>
+                </a:cubicBezTo>
+                <a:cubicBezTo>
+                  <a:pt x="3652577" y="9088"/>
+                  <a:pt x="3547615" y="11992"/>
+                  <a:pt x="3290011" y="27432"/>
+                </a:cubicBezTo>
+                <a:cubicBezTo>
+                  <a:pt x="3032407" y="42872"/>
+                  <a:pt x="2830268" y="17863"/>
+                  <a:pt x="2560320" y="27432"/>
+                </a:cubicBezTo>
+                <a:cubicBezTo>
+                  <a:pt x="2290372" y="37001"/>
+                  <a:pt x="2147422" y="15872"/>
+                  <a:pt x="1965046" y="27432"/>
+                </a:cubicBezTo>
+                <a:cubicBezTo>
+                  <a:pt x="1782670" y="38992"/>
+                  <a:pt x="1689791" y="49824"/>
+                  <a:pt x="1459382" y="27432"/>
+                </a:cubicBezTo>
+                <a:cubicBezTo>
+                  <a:pt x="1228973" y="5040"/>
+                  <a:pt x="915486" y="45645"/>
+                  <a:pt x="774497" y="27432"/>
+                </a:cubicBezTo>
+                <a:cubicBezTo>
+                  <a:pt x="633508" y="9219"/>
+                  <a:pt x="361442" y="-1963"/>
+                  <a:pt x="0" y="27432"/>
+                </a:cubicBezTo>
+                <a:cubicBezTo>
+                  <a:pt x="-1048" y="14992"/>
+                  <a:pt x="-1120" y="7447"/>
+                  <a:pt x="0" y="0"/>
+                </a:cubicBezTo>
+                <a:close/>
+              </a:path>
+              <a:path w="4480560" h="27432" stroke="0" extrusionOk="0">
+                <a:moveTo>
+                  <a:pt x="0" y="0"/>
+                </a:moveTo>
+                <a:cubicBezTo>
+                  <a:pt x="285465" y="225"/>
+                  <a:pt x="322691" y="16223"/>
+                  <a:pt x="595274" y="0"/>
+                </a:cubicBezTo>
+                <a:cubicBezTo>
+                  <a:pt x="867857" y="-16223"/>
+                  <a:pt x="989129" y="-11242"/>
+                  <a:pt x="1100938" y="0"/>
+                </a:cubicBezTo>
+                <a:cubicBezTo>
+                  <a:pt x="1212747" y="11242"/>
+                  <a:pt x="1574350" y="-36410"/>
+                  <a:pt x="1830629" y="0"/>
+                </a:cubicBezTo>
+                <a:cubicBezTo>
+                  <a:pt x="2086908" y="36410"/>
+                  <a:pt x="2180922" y="4645"/>
+                  <a:pt x="2425903" y="0"/>
+                </a:cubicBezTo>
+                <a:cubicBezTo>
+                  <a:pt x="2670884" y="-4645"/>
+                  <a:pt x="2782024" y="22929"/>
+                  <a:pt x="3021178" y="0"/>
+                </a:cubicBezTo>
+                <a:cubicBezTo>
+                  <a:pt x="3260332" y="-22929"/>
+                  <a:pt x="3456982" y="-1586"/>
+                  <a:pt x="3750869" y="0"/>
+                </a:cubicBezTo>
+                <a:cubicBezTo>
+                  <a:pt x="4044756" y="1586"/>
+                  <a:pt x="4302726" y="17043"/>
+                  <a:pt x="4480560" y="0"/>
+                </a:cubicBezTo>
+                <a:cubicBezTo>
+                  <a:pt x="4481045" y="9333"/>
+                  <a:pt x="4481838" y="19699"/>
+                  <a:pt x="4480560" y="27432"/>
+                </a:cubicBezTo>
+                <a:cubicBezTo>
+                  <a:pt x="4279652" y="2294"/>
+                  <a:pt x="4200762" y="50710"/>
+                  <a:pt x="3930091" y="27432"/>
+                </a:cubicBezTo>
+                <a:cubicBezTo>
+                  <a:pt x="3659420" y="4154"/>
+                  <a:pt x="3456052" y="31438"/>
+                  <a:pt x="3290011" y="27432"/>
+                </a:cubicBezTo>
+                <a:cubicBezTo>
+                  <a:pt x="3123970" y="23426"/>
+                  <a:pt x="2882392" y="41962"/>
+                  <a:pt x="2649931" y="27432"/>
+                </a:cubicBezTo>
+                <a:cubicBezTo>
+                  <a:pt x="2417470" y="12902"/>
+                  <a:pt x="2238426" y="16481"/>
+                  <a:pt x="2054657" y="27432"/>
+                </a:cubicBezTo>
+                <a:cubicBezTo>
+                  <a:pt x="1870888" y="38383"/>
+                  <a:pt x="1566368" y="54184"/>
+                  <a:pt x="1324966" y="27432"/>
+                </a:cubicBezTo>
+                <a:cubicBezTo>
+                  <a:pt x="1083564" y="680"/>
+                  <a:pt x="787410" y="20090"/>
+                  <a:pt x="595274" y="27432"/>
+                </a:cubicBezTo>
+                <a:cubicBezTo>
+                  <a:pt x="403138" y="34774"/>
+                  <a:pt x="169622" y="19643"/>
+                  <a:pt x="0" y="27432"/>
+                </a:cubicBezTo>
+                <a:cubicBezTo>
+                  <a:pt x="211" y="18145"/>
+                  <a:pt x="120" y="6480"/>
+                  <a:pt x="0" y="0"/>
+                </a:cubicBezTo>
+                <a:close/>
+              </a:path>
+            </a:pathLst>
+          </a:custGeom>
+          <a:solidFill>
+            <a:schemeClr val="accent1"/>
+          </a:solidFill>
+          <a:ln w="41275" cap="rnd">
+            <a:solidFill>
+              <a:schemeClr val="accent1"/>
+            </a:solidFill>
+            <a:round/>
+            <a:extLst>
+              <a:ext uri="{C807C97D-BFC1-408E-A445-0C87EB9F89A2}">
+                <ask:lineSketchStyleProps xmlns:ask="http://schemas.microsoft.com/office/drawing/2018/sketchyshapes" sd="1219033472">
+                  <a:prstGeom prst="rect">
+                    <a:avLst/>
+                  </a:prstGeom>
+                  <ask:type>
+                    <ask:lineSketchFreehand/>
+                  </ask:type>
+                </ask:lineSketchStyleProps>
+              </a:ext>
+            </a:extLst>
+          </a:ln>
+        </p:spPr>
+        <p:style>
+          <a:lnRef idx="2">
+            <a:schemeClr val="accent1">
+              <a:shade val="50000"/>
+            </a:schemeClr>
+          </a:lnRef>
+          <a:fillRef idx="1">
+            <a:schemeClr val="accent1"/>
+          </a:fillRef>
+          <a:effectRef idx="0">
+            <a:schemeClr val="accent1"/>
+          </a:effectRef>
+          <a:fontRef idx="minor">
+            <a:schemeClr val="lt1"/>
+          </a:fontRef>
+        </p:style>
+        <p:txBody>
+          <a:bodyPr rtlCol="0" anchor="ctr"/>
+          <a:lstStyle/>
+          <a:p>
+            <a:pPr algn="ctr"/>
+            <a:endParaRPr lang="en-US"/>
           </a:p>
         </p:txBody>
       </p:sp>
@@ -7965,9 +10243,16 @@
             <p:ph idx="1"/>
           </p:nvPr>
         </p:nvSpPr>
-        <p:spPr/>
+        <p:spPr>
+          <a:xfrm>
+            <a:off x="5298595" y="552091"/>
+            <a:ext cx="6052158" cy="5431536"/>
+          </a:xfrm>
+        </p:spPr>
         <p:txBody>
-          <a:bodyPr/>
+          <a:bodyPr anchor="ctr">
+            <a:normAutofit/>
+          </a:bodyPr>
           <a:lstStyle/>
           <a:p>
             <a:r>
@@ -8007,6 +10292,14 @@
 <file path=ppt/slides/slide7.xml><?xml version="1.0" encoding="utf-8"?>
 <p:sld xmlns:a="http://schemas.openxmlformats.org/drawingml/2006/main" xmlns:r="http://schemas.openxmlformats.org/officeDocument/2006/relationships" xmlns:p="http://schemas.openxmlformats.org/presentationml/2006/main">
   <p:cSld>
+    <p:bg>
+      <p:bgPr>
+        <a:solidFill>
+          <a:schemeClr val="bg1"/>
+        </a:solidFill>
+        <a:effectLst/>
+      </p:bgPr>
+    </p:bg>
     <p:spTree>
       <p:nvGrpSpPr>
         <p:cNvPr id="1" name=""/>
@@ -8021,6 +10314,66 @@
           <a:chExt cx="0" cy="0"/>
         </a:xfrm>
       </p:grpSpPr>
+      <p:sp useBgFill="1">
+        <p:nvSpPr>
+          <p:cNvPr id="8" name="Rectangle 7">
+            <a:extLst>
+              <a:ext uri="{FF2B5EF4-FFF2-40B4-BE49-F238E27FC236}">
+                <a16:creationId xmlns:a16="http://schemas.microsoft.com/office/drawing/2014/main" id="{777A147A-9ED8-46B4-8660-1B3C2AA880B5}"/>
+              </a:ext>
+              <a:ext uri="{C183D7F6-B498-43B3-948B-1728B52AA6E4}">
+                <adec:decorative xmlns:adec="http://schemas.microsoft.com/office/drawing/2017/decorative" val="1"/>
+              </a:ext>
+            </a:extLst>
+          </p:cNvPr>
+          <p:cNvSpPr>
+            <a:spLocks noGrp="1" noRot="1" noChangeAspect="1" noMove="1" noResize="1" noEditPoints="1" noAdjustHandles="1" noChangeArrowheads="1" noChangeShapeType="1" noTextEdit="1"/>
+          </p:cNvSpPr>
+          <p:nvPr>
+            <p:extLst>
+              <p:ext uri="{386F3935-93C4-4BCD-93E2-E3B085C9AB24}">
+                <p16:designElem xmlns:p16="http://schemas.microsoft.com/office/powerpoint/2015/main" val="1"/>
+              </p:ext>
+            </p:extLst>
+          </p:nvPr>
+        </p:nvSpPr>
+        <p:spPr>
+          <a:xfrm>
+            <a:off x="0" y="0"/>
+            <a:ext cx="12188952" cy="6858000"/>
+          </a:xfrm>
+          <a:prstGeom prst="rect">
+            <a:avLst/>
+          </a:prstGeom>
+          <a:ln>
+            <a:noFill/>
+          </a:ln>
+        </p:spPr>
+        <p:style>
+          <a:lnRef idx="2">
+            <a:schemeClr val="accent1">
+              <a:shade val="50000"/>
+            </a:schemeClr>
+          </a:lnRef>
+          <a:fillRef idx="1">
+            <a:schemeClr val="accent1"/>
+          </a:fillRef>
+          <a:effectRef idx="0">
+            <a:schemeClr val="accent1"/>
+          </a:effectRef>
+          <a:fontRef idx="minor">
+            <a:schemeClr val="lt1"/>
+          </a:fontRef>
+        </p:style>
+        <p:txBody>
+          <a:bodyPr rtlCol="0" anchor="ctr"/>
+          <a:lstStyle/>
+          <a:p>
+            <a:pPr algn="ctr"/>
+            <a:endParaRPr lang="en-US"/>
+          </a:p>
+        </p:txBody>
+      </p:sp>
       <p:sp>
         <p:nvSpPr>
           <p:cNvPr id="2" name="Titel 1">
@@ -8037,15 +10390,365 @@
             <p:ph type="title"/>
           </p:nvPr>
         </p:nvSpPr>
-        <p:spPr/>
+        <p:spPr>
+          <a:xfrm>
+            <a:off x="841248" y="548640"/>
+            <a:ext cx="3419540" cy="5431536"/>
+          </a:xfrm>
+        </p:spPr>
         <p:txBody>
-          <a:bodyPr/>
+          <a:bodyPr>
+            <a:normAutofit/>
+          </a:bodyPr>
           <a:lstStyle/>
           <a:p>
             <a:r>
-              <a:rPr lang="de-DE" dirty="0"/>
+              <a:rPr lang="de-DE" sz="6000"/>
               <a:t>Vielen Dank!</a:t>
             </a:r>
+          </a:p>
+        </p:txBody>
+      </p:sp>
+      <p:sp>
+        <p:nvSpPr>
+          <p:cNvPr id="10" name="Rectangle 6">
+            <a:extLst>
+              <a:ext uri="{FF2B5EF4-FFF2-40B4-BE49-F238E27FC236}">
+                <a16:creationId xmlns:a16="http://schemas.microsoft.com/office/drawing/2014/main" id="{5D6C15A0-C087-4593-8414-2B4EC1CDC3DE}"/>
+              </a:ext>
+              <a:ext uri="{C183D7F6-B498-43B3-948B-1728B52AA6E4}">
+                <adec:decorative xmlns:adec="http://schemas.microsoft.com/office/drawing/2017/decorative" val="1"/>
+              </a:ext>
+            </a:extLst>
+          </p:cNvPr>
+          <p:cNvSpPr>
+            <a:spLocks noGrp="1" noRot="1" noChangeAspect="1" noMove="1" noResize="1" noEditPoints="1" noAdjustHandles="1" noChangeArrowheads="1" noChangeShapeType="1" noTextEdit="1"/>
+          </p:cNvSpPr>
+          <p:nvPr>
+            <p:extLst>
+              <p:ext uri="{386F3935-93C4-4BCD-93E2-E3B085C9AB24}">
+                <p16:designElem xmlns:p16="http://schemas.microsoft.com/office/powerpoint/2015/main" val="1"/>
+              </p:ext>
+            </p:extLst>
+          </p:nvPr>
+        </p:nvSpPr>
+        <p:spPr>
+          <a:xfrm rot="5400000">
+            <a:off x="2539411" y="3254143"/>
+            <a:ext cx="4480560" cy="27432"/>
+          </a:xfrm>
+          <a:custGeom>
+            <a:avLst/>
+            <a:gdLst>
+              <a:gd name="connsiteX0" fmla="*/ 0 w 4480560"/>
+              <a:gd name="connsiteY0" fmla="*/ 0 h 27432"/>
+              <a:gd name="connsiteX1" fmla="*/ 595274 w 4480560"/>
+              <a:gd name="connsiteY1" fmla="*/ 0 h 27432"/>
+              <a:gd name="connsiteX2" fmla="*/ 1100938 w 4480560"/>
+              <a:gd name="connsiteY2" fmla="*/ 0 h 27432"/>
+              <a:gd name="connsiteX3" fmla="*/ 1651406 w 4480560"/>
+              <a:gd name="connsiteY3" fmla="*/ 0 h 27432"/>
+              <a:gd name="connsiteX4" fmla="*/ 2336292 w 4480560"/>
+              <a:gd name="connsiteY4" fmla="*/ 0 h 27432"/>
+              <a:gd name="connsiteX5" fmla="*/ 2931566 w 4480560"/>
+              <a:gd name="connsiteY5" fmla="*/ 0 h 27432"/>
+              <a:gd name="connsiteX6" fmla="*/ 3482035 w 4480560"/>
+              <a:gd name="connsiteY6" fmla="*/ 0 h 27432"/>
+              <a:gd name="connsiteX7" fmla="*/ 4480560 w 4480560"/>
+              <a:gd name="connsiteY7" fmla="*/ 0 h 27432"/>
+              <a:gd name="connsiteX8" fmla="*/ 4480560 w 4480560"/>
+              <a:gd name="connsiteY8" fmla="*/ 27432 h 27432"/>
+              <a:gd name="connsiteX9" fmla="*/ 3840480 w 4480560"/>
+              <a:gd name="connsiteY9" fmla="*/ 27432 h 27432"/>
+              <a:gd name="connsiteX10" fmla="*/ 3290011 w 4480560"/>
+              <a:gd name="connsiteY10" fmla="*/ 27432 h 27432"/>
+              <a:gd name="connsiteX11" fmla="*/ 2560320 w 4480560"/>
+              <a:gd name="connsiteY11" fmla="*/ 27432 h 27432"/>
+              <a:gd name="connsiteX12" fmla="*/ 1965046 w 4480560"/>
+              <a:gd name="connsiteY12" fmla="*/ 27432 h 27432"/>
+              <a:gd name="connsiteX13" fmla="*/ 1459382 w 4480560"/>
+              <a:gd name="connsiteY13" fmla="*/ 27432 h 27432"/>
+              <a:gd name="connsiteX14" fmla="*/ 774497 w 4480560"/>
+              <a:gd name="connsiteY14" fmla="*/ 27432 h 27432"/>
+              <a:gd name="connsiteX15" fmla="*/ 0 w 4480560"/>
+              <a:gd name="connsiteY15" fmla="*/ 27432 h 27432"/>
+              <a:gd name="connsiteX16" fmla="*/ 0 w 4480560"/>
+              <a:gd name="connsiteY16" fmla="*/ 0 h 27432"/>
+            </a:gdLst>
+            <a:ahLst/>
+            <a:cxnLst>
+              <a:cxn ang="0">
+                <a:pos x="connsiteX0" y="connsiteY0"/>
+              </a:cxn>
+              <a:cxn ang="0">
+                <a:pos x="connsiteX1" y="connsiteY1"/>
+              </a:cxn>
+              <a:cxn ang="0">
+                <a:pos x="connsiteX2" y="connsiteY2"/>
+              </a:cxn>
+              <a:cxn ang="0">
+                <a:pos x="connsiteX3" y="connsiteY3"/>
+              </a:cxn>
+              <a:cxn ang="0">
+                <a:pos x="connsiteX4" y="connsiteY4"/>
+              </a:cxn>
+              <a:cxn ang="0">
+                <a:pos x="connsiteX5" y="connsiteY5"/>
+              </a:cxn>
+              <a:cxn ang="0">
+                <a:pos x="connsiteX6" y="connsiteY6"/>
+              </a:cxn>
+              <a:cxn ang="0">
+                <a:pos x="connsiteX7" y="connsiteY7"/>
+              </a:cxn>
+              <a:cxn ang="0">
+                <a:pos x="connsiteX8" y="connsiteY8"/>
+              </a:cxn>
+              <a:cxn ang="0">
+                <a:pos x="connsiteX9" y="connsiteY9"/>
+              </a:cxn>
+              <a:cxn ang="0">
+                <a:pos x="connsiteX10" y="connsiteY10"/>
+              </a:cxn>
+              <a:cxn ang="0">
+                <a:pos x="connsiteX11" y="connsiteY11"/>
+              </a:cxn>
+              <a:cxn ang="0">
+                <a:pos x="connsiteX12" y="connsiteY12"/>
+              </a:cxn>
+              <a:cxn ang="0">
+                <a:pos x="connsiteX13" y="connsiteY13"/>
+              </a:cxn>
+              <a:cxn ang="0">
+                <a:pos x="connsiteX14" y="connsiteY14"/>
+              </a:cxn>
+              <a:cxn ang="0">
+                <a:pos x="connsiteX15" y="connsiteY15"/>
+              </a:cxn>
+              <a:cxn ang="0">
+                <a:pos x="connsiteX16" y="connsiteY16"/>
+              </a:cxn>
+            </a:cxnLst>
+            <a:rect l="l" t="t" r="r" b="b"/>
+            <a:pathLst>
+              <a:path w="4480560" h="27432" fill="none" extrusionOk="0">
+                <a:moveTo>
+                  <a:pt x="0" y="0"/>
+                </a:moveTo>
+                <a:cubicBezTo>
+                  <a:pt x="267821" y="8731"/>
+                  <a:pt x="334105" y="2629"/>
+                  <a:pt x="595274" y="0"/>
+                </a:cubicBezTo>
+                <a:cubicBezTo>
+                  <a:pt x="856443" y="-2629"/>
+                  <a:pt x="863808" y="-13353"/>
+                  <a:pt x="1100938" y="0"/>
+                </a:cubicBezTo>
+                <a:cubicBezTo>
+                  <a:pt x="1338068" y="13353"/>
+                  <a:pt x="1431663" y="-25862"/>
+                  <a:pt x="1651406" y="0"/>
+                </a:cubicBezTo>
+                <a:cubicBezTo>
+                  <a:pt x="1871149" y="25862"/>
+                  <a:pt x="2173163" y="23827"/>
+                  <a:pt x="2336292" y="0"/>
+                </a:cubicBezTo>
+                <a:cubicBezTo>
+                  <a:pt x="2499421" y="-23827"/>
+                  <a:pt x="2720589" y="28148"/>
+                  <a:pt x="2931566" y="0"/>
+                </a:cubicBezTo>
+                <a:cubicBezTo>
+                  <a:pt x="3142543" y="-28148"/>
+                  <a:pt x="3323630" y="27022"/>
+                  <a:pt x="3482035" y="0"/>
+                </a:cubicBezTo>
+                <a:cubicBezTo>
+                  <a:pt x="3640440" y="-27022"/>
+                  <a:pt x="4012110" y="-20118"/>
+                  <a:pt x="4480560" y="0"/>
+                </a:cubicBezTo>
+                <a:cubicBezTo>
+                  <a:pt x="4479587" y="8304"/>
+                  <a:pt x="4480082" y="21512"/>
+                  <a:pt x="4480560" y="27432"/>
+                </a:cubicBezTo>
+                <a:cubicBezTo>
+                  <a:pt x="4314132" y="24068"/>
+                  <a:pt x="4028383" y="45776"/>
+                  <a:pt x="3840480" y="27432"/>
+                </a:cubicBezTo>
+                <a:cubicBezTo>
+                  <a:pt x="3652577" y="9088"/>
+                  <a:pt x="3547615" y="11992"/>
+                  <a:pt x="3290011" y="27432"/>
+                </a:cubicBezTo>
+                <a:cubicBezTo>
+                  <a:pt x="3032407" y="42872"/>
+                  <a:pt x="2830268" y="17863"/>
+                  <a:pt x="2560320" y="27432"/>
+                </a:cubicBezTo>
+                <a:cubicBezTo>
+                  <a:pt x="2290372" y="37001"/>
+                  <a:pt x="2147422" y="15872"/>
+                  <a:pt x="1965046" y="27432"/>
+                </a:cubicBezTo>
+                <a:cubicBezTo>
+                  <a:pt x="1782670" y="38992"/>
+                  <a:pt x="1689791" y="49824"/>
+                  <a:pt x="1459382" y="27432"/>
+                </a:cubicBezTo>
+                <a:cubicBezTo>
+                  <a:pt x="1228973" y="5040"/>
+                  <a:pt x="915486" y="45645"/>
+                  <a:pt x="774497" y="27432"/>
+                </a:cubicBezTo>
+                <a:cubicBezTo>
+                  <a:pt x="633508" y="9219"/>
+                  <a:pt x="361442" y="-1963"/>
+                  <a:pt x="0" y="27432"/>
+                </a:cubicBezTo>
+                <a:cubicBezTo>
+                  <a:pt x="-1048" y="14992"/>
+                  <a:pt x="-1120" y="7447"/>
+                  <a:pt x="0" y="0"/>
+                </a:cubicBezTo>
+                <a:close/>
+              </a:path>
+              <a:path w="4480560" h="27432" stroke="0" extrusionOk="0">
+                <a:moveTo>
+                  <a:pt x="0" y="0"/>
+                </a:moveTo>
+                <a:cubicBezTo>
+                  <a:pt x="285465" y="225"/>
+                  <a:pt x="322691" y="16223"/>
+                  <a:pt x="595274" y="0"/>
+                </a:cubicBezTo>
+                <a:cubicBezTo>
+                  <a:pt x="867857" y="-16223"/>
+                  <a:pt x="989129" y="-11242"/>
+                  <a:pt x="1100938" y="0"/>
+                </a:cubicBezTo>
+                <a:cubicBezTo>
+                  <a:pt x="1212747" y="11242"/>
+                  <a:pt x="1574350" y="-36410"/>
+                  <a:pt x="1830629" y="0"/>
+                </a:cubicBezTo>
+                <a:cubicBezTo>
+                  <a:pt x="2086908" y="36410"/>
+                  <a:pt x="2180922" y="4645"/>
+                  <a:pt x="2425903" y="0"/>
+                </a:cubicBezTo>
+                <a:cubicBezTo>
+                  <a:pt x="2670884" y="-4645"/>
+                  <a:pt x="2782024" y="22929"/>
+                  <a:pt x="3021178" y="0"/>
+                </a:cubicBezTo>
+                <a:cubicBezTo>
+                  <a:pt x="3260332" y="-22929"/>
+                  <a:pt x="3456982" y="-1586"/>
+                  <a:pt x="3750869" y="0"/>
+                </a:cubicBezTo>
+                <a:cubicBezTo>
+                  <a:pt x="4044756" y="1586"/>
+                  <a:pt x="4302726" y="17043"/>
+                  <a:pt x="4480560" y="0"/>
+                </a:cubicBezTo>
+                <a:cubicBezTo>
+                  <a:pt x="4481045" y="9333"/>
+                  <a:pt x="4481838" y="19699"/>
+                  <a:pt x="4480560" y="27432"/>
+                </a:cubicBezTo>
+                <a:cubicBezTo>
+                  <a:pt x="4279652" y="2294"/>
+                  <a:pt x="4200762" y="50710"/>
+                  <a:pt x="3930091" y="27432"/>
+                </a:cubicBezTo>
+                <a:cubicBezTo>
+                  <a:pt x="3659420" y="4154"/>
+                  <a:pt x="3456052" y="31438"/>
+                  <a:pt x="3290011" y="27432"/>
+                </a:cubicBezTo>
+                <a:cubicBezTo>
+                  <a:pt x="3123970" y="23426"/>
+                  <a:pt x="2882392" y="41962"/>
+                  <a:pt x="2649931" y="27432"/>
+                </a:cubicBezTo>
+                <a:cubicBezTo>
+                  <a:pt x="2417470" y="12902"/>
+                  <a:pt x="2238426" y="16481"/>
+                  <a:pt x="2054657" y="27432"/>
+                </a:cubicBezTo>
+                <a:cubicBezTo>
+                  <a:pt x="1870888" y="38383"/>
+                  <a:pt x="1566368" y="54184"/>
+                  <a:pt x="1324966" y="27432"/>
+                </a:cubicBezTo>
+                <a:cubicBezTo>
+                  <a:pt x="1083564" y="680"/>
+                  <a:pt x="787410" y="20090"/>
+                  <a:pt x="595274" y="27432"/>
+                </a:cubicBezTo>
+                <a:cubicBezTo>
+                  <a:pt x="403138" y="34774"/>
+                  <a:pt x="169622" y="19643"/>
+                  <a:pt x="0" y="27432"/>
+                </a:cubicBezTo>
+                <a:cubicBezTo>
+                  <a:pt x="211" y="18145"/>
+                  <a:pt x="120" y="6480"/>
+                  <a:pt x="0" y="0"/>
+                </a:cubicBezTo>
+                <a:close/>
+              </a:path>
+            </a:pathLst>
+          </a:custGeom>
+          <a:solidFill>
+            <a:schemeClr val="accent1"/>
+          </a:solidFill>
+          <a:ln w="41275" cap="rnd">
+            <a:solidFill>
+              <a:schemeClr val="accent1"/>
+            </a:solidFill>
+            <a:round/>
+            <a:extLst>
+              <a:ext uri="{C807C97D-BFC1-408E-A445-0C87EB9F89A2}">
+                <ask:lineSketchStyleProps xmlns:ask="http://schemas.microsoft.com/office/drawing/2018/sketchyshapes" sd="1219033472">
+                  <a:prstGeom prst="rect">
+                    <a:avLst/>
+                  </a:prstGeom>
+                  <ask:type>
+                    <ask:lineSketchFreehand/>
+                  </ask:type>
+                </ask:lineSketchStyleProps>
+              </a:ext>
+            </a:extLst>
+          </a:ln>
+        </p:spPr>
+        <p:style>
+          <a:lnRef idx="2">
+            <a:schemeClr val="accent1">
+              <a:shade val="50000"/>
+            </a:schemeClr>
+          </a:lnRef>
+          <a:fillRef idx="1">
+            <a:schemeClr val="accent1"/>
+          </a:fillRef>
+          <a:effectRef idx="0">
+            <a:schemeClr val="accent1"/>
+          </a:effectRef>
+          <a:fontRef idx="minor">
+            <a:schemeClr val="lt1"/>
+          </a:fontRef>
+        </p:style>
+        <p:txBody>
+          <a:bodyPr rtlCol="0" anchor="ctr"/>
+          <a:lstStyle/>
+          <a:p>
+            <a:pPr algn="ctr"/>
+            <a:endParaRPr lang="en-US"/>
           </a:p>
         </p:txBody>
       </p:sp>
@@ -8065,9 +10768,16 @@
             <p:ph idx="1"/>
           </p:nvPr>
         </p:nvSpPr>
-        <p:spPr/>
+        <p:spPr>
+          <a:xfrm>
+            <a:off x="5298595" y="552091"/>
+            <a:ext cx="6052158" cy="5431536"/>
+          </a:xfrm>
+        </p:spPr>
         <p:txBody>
-          <a:bodyPr/>
+          <a:bodyPr anchor="ctr">
+            <a:normAutofit/>
+          </a:bodyPr>
           <a:lstStyle/>
           <a:p>
             <a:endParaRPr lang="de-DE"/>

</xml_diff>